<commit_message>
preps lmao - README.md update - Presentation for CatClient on RU.pptx because
</commit_message>
<xml_diff>
--- a/Presentation for CatClient on RU.pptx
+++ b/Presentation for CatClient on RU.pptx
@@ -5,10 +5,10 @@
     <p:sldMasterId id="2147483648" r:id="rId1"/>
   </p:sldMasterIdLst>
   <p:notesMasterIdLst>
-    <p:notesMasterId r:id="rId9"/>
+    <p:notesMasterId r:id="rId8"/>
   </p:notesMasterIdLst>
   <p:handoutMasterIdLst>
-    <p:handoutMasterId r:id="rId10"/>
+    <p:handoutMasterId r:id="rId9"/>
   </p:handoutMasterIdLst>
   <p:sldIdLst>
     <p:sldId id="256" r:id="rId2"/>
@@ -17,7 +17,6 @@
     <p:sldId id="278" r:id="rId5"/>
     <p:sldId id="283" r:id="rId6"/>
     <p:sldId id="282" r:id="rId7"/>
-    <p:sldId id="285" r:id="rId8"/>
   </p:sldIdLst>
   <p:sldSz cx="12192000" cy="6858000"/>
   <p:notesSz cx="6858000" cy="9144000"/>
@@ -254,7 +253,7 @@
             <a:pPr rtl="0"/>
             <a:fld id="{8196FF38-ED5D-48F9-86A5-23A56EB1D6F9}" type="datetime1">
               <a:rPr lang="ru-RU" smtClean="0"/>
-              <a:t>10.05.2020</a:t>
+              <a:t>11.05.2020</a:t>
             </a:fld>
             <a:endParaRPr lang="ru-RU" dirty="0"/>
           </a:p>
@@ -435,7 +434,7 @@
             <a:fld id="{3148F836-3A79-4E2E-BD39-F0469988701B}" type="datetime1">
               <a:rPr lang="ru-RU" smtClean="0"/>
               <a:pPr/>
-              <a:t>10.05.2020</a:t>
+              <a:t>11.05.2020</a:t>
             </a:fld>
             <a:endParaRPr lang="ru-RU" dirty="0"/>
           </a:p>
@@ -1135,92 +1134,6 @@
 </p:notes>
 </file>
 
-<file path=ppt/notesSlides/notesSlide6.xml><?xml version="1.0" encoding="utf-8"?>
-<p:notes xmlns:a="http://schemas.openxmlformats.org/drawingml/2006/main" xmlns:r="http://schemas.openxmlformats.org/officeDocument/2006/relationships" xmlns:p="http://schemas.openxmlformats.org/presentationml/2006/main">
-  <p:cSld>
-    <p:spTree>
-      <p:nvGrpSpPr>
-        <p:cNvPr id="1" name=""/>
-        <p:cNvGrpSpPr/>
-        <p:nvPr/>
-      </p:nvGrpSpPr>
-      <p:grpSpPr>
-        <a:xfrm>
-          <a:off x="0" y="0"/>
-          <a:ext cx="0" cy="0"/>
-          <a:chOff x="0" y="0"/>
-          <a:chExt cx="0" cy="0"/>
-        </a:xfrm>
-      </p:grpSpPr>
-      <p:sp>
-        <p:nvSpPr>
-          <p:cNvPr id="2" name="Образ слайда 1"/>
-          <p:cNvSpPr>
-            <a:spLocks noGrp="1" noRot="1" noChangeAspect="1"/>
-          </p:cNvSpPr>
-          <p:nvPr>
-            <p:ph type="sldImg"/>
-          </p:nvPr>
-        </p:nvSpPr>
-        <p:spPr/>
-      </p:sp>
-      <p:sp>
-        <p:nvSpPr>
-          <p:cNvPr id="3" name="Заметки 2"/>
-          <p:cNvSpPr>
-            <a:spLocks noGrp="1"/>
-          </p:cNvSpPr>
-          <p:nvPr>
-            <p:ph type="body" idx="1"/>
-          </p:nvPr>
-        </p:nvSpPr>
-        <p:spPr/>
-        <p:txBody>
-          <a:bodyPr rtlCol="0"/>
-          <a:lstStyle/>
-          <a:p>
-            <a:pPr rtl="0"/>
-            <a:endParaRPr lang="ru-RU" dirty="0"/>
-          </a:p>
-        </p:txBody>
-      </p:sp>
-      <p:sp>
-        <p:nvSpPr>
-          <p:cNvPr id="4" name="Номер слайда 3"/>
-          <p:cNvSpPr>
-            <a:spLocks noGrp="1"/>
-          </p:cNvSpPr>
-          <p:nvPr>
-            <p:ph type="sldNum" sz="quarter" idx="5"/>
-          </p:nvPr>
-        </p:nvSpPr>
-        <p:spPr/>
-        <p:txBody>
-          <a:bodyPr rtlCol="0"/>
-          <a:lstStyle/>
-          <a:p>
-            <a:pPr rtl="0"/>
-            <a:fld id="{BE60DC36-8EFA-4378-9855-E019C55AC472}" type="slidenum">
-              <a:rPr lang="ru-RU" smtClean="0"/>
-              <a:t>7</a:t>
-            </a:fld>
-            <a:endParaRPr lang="ru-RU" dirty="0"/>
-          </a:p>
-        </p:txBody>
-      </p:sp>
-    </p:spTree>
-    <p:extLst>
-      <p:ext uri="{BB962C8B-B14F-4D97-AF65-F5344CB8AC3E}">
-        <p14:creationId xmlns:p14="http://schemas.microsoft.com/office/powerpoint/2010/main" val="1054801191"/>
-      </p:ext>
-    </p:extLst>
-  </p:cSld>
-  <p:clrMapOvr>
-    <a:masterClrMapping/>
-  </p:clrMapOvr>
-</p:notes>
-</file>
-
 <file path=ppt/slideLayouts/slideLayout1.xml><?xml version="1.0" encoding="utf-8"?>
 <p:sldLayout xmlns:a="http://schemas.openxmlformats.org/drawingml/2006/main" xmlns:r="http://schemas.openxmlformats.org/officeDocument/2006/relationships" xmlns:p="http://schemas.openxmlformats.org/presentationml/2006/main" type="title" preserve="1">
   <p:cSld name="Титульный слайд">
@@ -1373,7 +1286,7 @@
             <a:pPr rtl="0"/>
             <a:fld id="{AD487AC8-2E27-4521-B851-B6631051F3D3}" type="datetime1">
               <a:rPr lang="ru-RU" noProof="0" smtClean="0"/>
-              <a:t>10.05.2020</a:t>
+              <a:t>11.05.2020</a:t>
             </a:fld>
             <a:endParaRPr lang="ru-RU" noProof="0" dirty="0"/>
           </a:p>
@@ -1577,7 +1490,7 @@
             <a:pPr rtl="0"/>
             <a:fld id="{1192B142-FCBD-4EC4-8EEE-20AF3A45CBB5}" type="datetime1">
               <a:rPr lang="ru-RU" noProof="0" smtClean="0"/>
-              <a:t>10.05.2020</a:t>
+              <a:t>11.05.2020</a:t>
             </a:fld>
             <a:endParaRPr lang="ru-RU" noProof="0" dirty="0"/>
           </a:p>
@@ -1791,7 +1704,7 @@
             <a:pPr rtl="0"/>
             <a:fld id="{BD623BE9-F292-4C48-9030-5DC41B0B2C7D}" type="datetime1">
               <a:rPr lang="ru-RU" noProof="0" smtClean="0"/>
-              <a:t>10.05.2020</a:t>
+              <a:t>11.05.2020</a:t>
             </a:fld>
             <a:endParaRPr lang="ru-RU" noProof="0" dirty="0"/>
           </a:p>
@@ -1995,7 +1908,7 @@
             <a:pPr rtl="0"/>
             <a:fld id="{999A523A-9522-4FC8-BF19-7168970C597F}" type="datetime1">
               <a:rPr lang="ru-RU" noProof="0" smtClean="0"/>
-              <a:t>10.05.2020</a:t>
+              <a:t>11.05.2020</a:t>
             </a:fld>
             <a:endParaRPr lang="ru-RU" noProof="0" dirty="0"/>
           </a:p>
@@ -2275,7 +2188,7 @@
             <a:pPr rtl="0"/>
             <a:fld id="{50448D71-62B7-4716-9BB5-CB3D729E920F}" type="datetime1">
               <a:rPr lang="ru-RU" noProof="0" smtClean="0"/>
-              <a:t>10.05.2020</a:t>
+              <a:t>11.05.2020</a:t>
             </a:fld>
             <a:endParaRPr lang="ru-RU" noProof="0" dirty="0"/>
           </a:p>
@@ -2547,7 +2460,7 @@
             <a:pPr rtl="0"/>
             <a:fld id="{170C37C4-1A33-40EC-A67A-49B496E25738}" type="datetime1">
               <a:rPr lang="ru-RU" noProof="0" smtClean="0"/>
-              <a:t>10.05.2020</a:t>
+              <a:t>11.05.2020</a:t>
             </a:fld>
             <a:endParaRPr lang="ru-RU" noProof="0" dirty="0"/>
           </a:p>
@@ -2966,7 +2879,7 @@
             <a:pPr rtl="0"/>
             <a:fld id="{5EB0E952-F832-496E-ABEA-42AE0AFA6CCC}" type="datetime1">
               <a:rPr lang="ru-RU" noProof="0" smtClean="0"/>
-              <a:t>10.05.2020</a:t>
+              <a:t>11.05.2020</a:t>
             </a:fld>
             <a:endParaRPr lang="ru-RU" noProof="0" dirty="0"/>
           </a:p>
@@ -3112,7 +3025,7 @@
             <a:pPr rtl="0"/>
             <a:fld id="{ACDD5508-11FB-4992-B00C-2F96E71032D7}" type="datetime1">
               <a:rPr lang="ru-RU" noProof="0" smtClean="0"/>
-              <a:t>10.05.2020</a:t>
+              <a:t>11.05.2020</a:t>
             </a:fld>
             <a:endParaRPr lang="ru-RU" noProof="0" dirty="0"/>
           </a:p>
@@ -3228,7 +3141,7 @@
             <a:pPr rtl="0"/>
             <a:fld id="{F236027D-058E-4138-A066-359F07C6D214}" type="datetime1">
               <a:rPr lang="ru-RU" noProof="0" smtClean="0"/>
-              <a:t>10.05.2020</a:t>
+              <a:t>11.05.2020</a:t>
             </a:fld>
             <a:endParaRPr lang="ru-RU" noProof="0" dirty="0"/>
           </a:p>
@@ -3545,7 +3458,7 @@
             <a:pPr rtl="0"/>
             <a:fld id="{37510823-F23A-4639-B218-6B9BC0CC18D8}" type="datetime1">
               <a:rPr lang="ru-RU" noProof="0" smtClean="0"/>
-              <a:t>10.05.2020</a:t>
+              <a:t>11.05.2020</a:t>
             </a:fld>
             <a:endParaRPr lang="ru-RU" noProof="0" dirty="0"/>
           </a:p>
@@ -3843,7 +3756,7 @@
             <a:pPr rtl="0"/>
             <a:fld id="{355D43D7-3745-4F9A-8694-98B1E0E20033}" type="datetime1">
               <a:rPr lang="ru-RU" noProof="0" smtClean="0"/>
-              <a:t>10.05.2020</a:t>
+              <a:t>11.05.2020</a:t>
             </a:fld>
             <a:endParaRPr lang="ru-RU" noProof="0" dirty="0"/>
           </a:p>
@@ -4088,7 +4001,7 @@
             <a:pPr rtl="0"/>
             <a:fld id="{FE119431-1E6E-4E07-A8B6-073D5DF11CA2}" type="datetime1">
               <a:rPr lang="ru-RU" noProof="0" smtClean="0"/>
-              <a:t>10.05.2020</a:t>
+              <a:t>11.05.2020</a:t>
             </a:fld>
             <a:endParaRPr lang="ru-RU" noProof="0" dirty="0"/>
           </a:p>
@@ -4563,20 +4476,36 @@
               <a:t>Web </a:t>
             </a:r>
             <a:r>
+              <a:rPr lang="en-US" dirty="0" smtClean="0">
+                <a:solidFill>
+                  <a:schemeClr val="bg1"/>
+                </a:solidFill>
+              </a:rPr>
+              <a:t>Project</a:t>
+            </a:r>
+            <a:r>
+              <a:rPr lang="ru-RU" dirty="0" smtClean="0">
+                <a:solidFill>
+                  <a:schemeClr val="bg1"/>
+                </a:solidFill>
+              </a:rPr>
+              <a:t> </a:t>
+            </a:r>
+            <a:r>
+              <a:rPr lang="en-US" dirty="0" err="1" smtClean="0">
+                <a:solidFill>
+                  <a:schemeClr val="bg1"/>
+                </a:solidFill>
+              </a:rPr>
+              <a:t>CatClient</a:t>
+            </a:r>
+            <a:r>
               <a:rPr lang="ru-RU" dirty="0">
                 <a:solidFill>
                   <a:schemeClr val="bg1"/>
                 </a:solidFill>
               </a:rPr>
-              <a:t>Проект </a:t>
-            </a:r>
-            <a:r>
-              <a:rPr lang="en-US" dirty="0" err="1">
-                <a:solidFill>
-                  <a:schemeClr val="bg1"/>
-                </a:solidFill>
-              </a:rPr>
-              <a:t>Catclient</a:t>
+              <a:t/>
             </a:r>
             <a:br>
               <a:rPr lang="ru-RU" dirty="0">
@@ -4609,7 +4538,7 @@
                 <a16:creationId xmlns:a16="http://schemas.microsoft.com/office/drawing/2014/main" id="{1C59176D-59A8-4C02-B448-EE01232FB3E7}"/>
               </a:ext>
               <a:ext uri="{C183D7F6-B498-43B3-948B-1728B52AA6E4}">
-                <adec:decorative xmlns:adec="http://schemas.microsoft.com/office/drawing/2017/decorative" val="1"/>
+                <adec:decorative xmlns:adec="http://schemas.microsoft.com/office/drawing/2017/decorative" xmlns="" val="1"/>
               </a:ext>
             </a:extLst>
           </p:cNvPr>
@@ -4664,7 +4593,7 @@
                 <a16:creationId xmlns:a16="http://schemas.microsoft.com/office/drawing/2014/main" id="{A50B1817-3C7F-41BC-8557-7A00C928EE16}"/>
               </a:ext>
               <a:ext uri="{C183D7F6-B498-43B3-948B-1728B52AA6E4}">
-                <adec:decorative xmlns:adec="http://schemas.microsoft.com/office/drawing/2017/decorative" val="1"/>
+                <adec:decorative xmlns:adec="http://schemas.microsoft.com/office/drawing/2017/decorative" xmlns="" val="1"/>
               </a:ext>
             </a:extLst>
           </p:cNvPr>
@@ -6025,7 +5954,7 @@
                 <a16:creationId xmlns:a16="http://schemas.microsoft.com/office/drawing/2014/main" id="{364CFD90-D0E1-4BC3-9D8B-7503E2632C39}"/>
               </a:ext>
               <a:ext uri="{C183D7F6-B498-43B3-948B-1728B52AA6E4}">
-                <adec:decorative xmlns:adec="http://schemas.microsoft.com/office/drawing/2017/decorative" val="1"/>
+                <adec:decorative xmlns:adec="http://schemas.microsoft.com/office/drawing/2017/decorative" xmlns="" val="1"/>
               </a:ext>
             </a:extLst>
           </p:cNvPr>
@@ -6113,7 +6042,7 @@
                 <a16:creationId xmlns:a16="http://schemas.microsoft.com/office/drawing/2014/main" id="{D0986099-F5F2-4E8B-BE17-81194861A00C}"/>
               </a:ext>
               <a:ext uri="{C183D7F6-B498-43B3-948B-1728B52AA6E4}">
-                <adec:decorative xmlns:adec="http://schemas.microsoft.com/office/drawing/2017/decorative" val="1"/>
+                <adec:decorative xmlns:adec="http://schemas.microsoft.com/office/drawing/2017/decorative" xmlns="" val="1"/>
               </a:ext>
             </a:extLst>
           </p:cNvPr>
@@ -6224,7 +6153,7 @@
                 <a16:creationId xmlns:a16="http://schemas.microsoft.com/office/drawing/2014/main" id="{83E690F4-843A-47A5-8620-4FB01C0D8E68}"/>
               </a:ext>
               <a:ext uri="{C183D7F6-B498-43B3-948B-1728B52AA6E4}">
-                <adec:decorative xmlns:adec="http://schemas.microsoft.com/office/drawing/2017/decorative" val="1"/>
+                <adec:decorative xmlns:adec="http://schemas.microsoft.com/office/drawing/2017/decorative" xmlns="" val="1"/>
               </a:ext>
             </a:extLst>
           </p:cNvPr>
@@ -6273,7 +6202,7 @@
                 <a16:creationId xmlns:a16="http://schemas.microsoft.com/office/drawing/2014/main" id="{E3ECCC05-FF78-40FA-84FF-172821D8B58A}"/>
               </a:ext>
               <a:ext uri="{C183D7F6-B498-43B3-948B-1728B52AA6E4}">
-                <adec:decorative xmlns:adec="http://schemas.microsoft.com/office/drawing/2017/decorative" val="1"/>
+                <adec:decorative xmlns:adec="http://schemas.microsoft.com/office/drawing/2017/decorative" xmlns="" val="1"/>
               </a:ext>
             </a:extLst>
           </p:cNvPr>
@@ -6336,7 +6265,7 @@
                 <a16:creationId xmlns:a16="http://schemas.microsoft.com/office/drawing/2014/main" id="{EB7F2E37-0ACF-4E8A-9C1D-EC5B65BA2906}"/>
               </a:ext>
               <a:ext uri="{C183D7F6-B498-43B3-948B-1728B52AA6E4}">
-                <adec:decorative xmlns:adec="http://schemas.microsoft.com/office/drawing/2017/decorative" val="1"/>
+                <adec:decorative xmlns:adec="http://schemas.microsoft.com/office/drawing/2017/decorative" xmlns="" val="1"/>
               </a:ext>
             </a:extLst>
           </p:cNvPr>
@@ -6407,7 +6336,7 @@
                 <a16:creationId xmlns:a16="http://schemas.microsoft.com/office/drawing/2014/main" id="{88F812F5-70AF-4FBD-80D9-D59B3C456D5E}"/>
               </a:ext>
               <a:ext uri="{C183D7F6-B498-43B3-948B-1728B52AA6E4}">
-                <adec:decorative xmlns:adec="http://schemas.microsoft.com/office/drawing/2017/decorative" val="1"/>
+                <adec:decorative xmlns:adec="http://schemas.microsoft.com/office/drawing/2017/decorative" xmlns="" val="1"/>
               </a:ext>
             </a:extLst>
           </p:cNvPr>
@@ -6464,7 +6393,7 @@
                 <a16:creationId xmlns:a16="http://schemas.microsoft.com/office/drawing/2014/main" id="{952C5002-7E64-4069-ACA0-6876E54A9B46}"/>
               </a:ext>
               <a:ext uri="{C183D7F6-B498-43B3-948B-1728B52AA6E4}">
-                <adec:decorative xmlns:adec="http://schemas.microsoft.com/office/drawing/2017/decorative" val="1"/>
+                <adec:decorative xmlns:adec="http://schemas.microsoft.com/office/drawing/2017/decorative" xmlns="" val="1"/>
               </a:ext>
             </a:extLst>
           </p:cNvPr>
@@ -6538,7 +6467,7 @@
                 <a16:creationId xmlns:a16="http://schemas.microsoft.com/office/drawing/2014/main" id="{A49C5F3A-6F0D-4A0F-AE6E-92F342C22ACD}"/>
               </a:ext>
               <a:ext uri="{C183D7F6-B498-43B3-948B-1728B52AA6E4}">
-                <adec:decorative xmlns:adec="http://schemas.microsoft.com/office/drawing/2017/decorative" val="1"/>
+                <adec:decorative xmlns:adec="http://schemas.microsoft.com/office/drawing/2017/decorative" xmlns="" val="1"/>
               </a:ext>
             </a:extLst>
           </p:cNvPr>
@@ -6595,7 +6524,7 @@
                 <a16:creationId xmlns:a16="http://schemas.microsoft.com/office/drawing/2014/main" id="{94A75A79-A67A-4A23-8588-7FC5EB9A5183}"/>
               </a:ext>
               <a:ext uri="{C183D7F6-B498-43B3-948B-1728B52AA6E4}">
-                <adec:decorative xmlns:adec="http://schemas.microsoft.com/office/drawing/2017/decorative" val="1"/>
+                <adec:decorative xmlns:adec="http://schemas.microsoft.com/office/drawing/2017/decorative" xmlns="" val="1"/>
               </a:ext>
             </a:extLst>
           </p:cNvPr>
@@ -6655,7 +6584,7 @@
                 <a16:creationId xmlns:a16="http://schemas.microsoft.com/office/drawing/2014/main" id="{71BB375D-5EE6-4428-9817-2C7DB6B94332}"/>
               </a:ext>
               <a:ext uri="{C183D7F6-B498-43B3-948B-1728B52AA6E4}">
-                <adec:decorative xmlns:adec="http://schemas.microsoft.com/office/drawing/2017/decorative" val="1"/>
+                <adec:decorative xmlns:adec="http://schemas.microsoft.com/office/drawing/2017/decorative" xmlns="" val="1"/>
               </a:ext>
             </a:extLst>
           </p:cNvPr>
@@ -6723,7 +6652,7 @@
                 <a16:creationId xmlns:a16="http://schemas.microsoft.com/office/drawing/2014/main" id="{B3A511B7-C7F3-4107-9962-1E10D2E087DD}"/>
               </a:ext>
               <a:ext uri="{C183D7F6-B498-43B3-948B-1728B52AA6E4}">
-                <adec:decorative xmlns:adec="http://schemas.microsoft.com/office/drawing/2017/decorative" val="1"/>
+                <adec:decorative xmlns:adec="http://schemas.microsoft.com/office/drawing/2017/decorative" xmlns="" val="1"/>
               </a:ext>
             </a:extLst>
           </p:cNvPr>
@@ -6780,7 +6709,7 @@
                 <a16:creationId xmlns:a16="http://schemas.microsoft.com/office/drawing/2014/main" id="{D4D7D4B6-62C2-45AB-89A5-3A41DA021FD2}"/>
               </a:ext>
               <a:ext uri="{C183D7F6-B498-43B3-948B-1728B52AA6E4}">
-                <adec:decorative xmlns:adec="http://schemas.microsoft.com/office/drawing/2017/decorative" val="1"/>
+                <adec:decorative xmlns:adec="http://schemas.microsoft.com/office/drawing/2017/decorative" xmlns="" val="1"/>
               </a:ext>
             </a:extLst>
           </p:cNvPr>
@@ -6863,7 +6792,7 @@
                 <a16:creationId xmlns:a16="http://schemas.microsoft.com/office/drawing/2014/main" id="{83902602-D4BC-4D44-AC14-BB55A86C5D06}"/>
               </a:ext>
               <a:ext uri="{C183D7F6-B498-43B3-948B-1728B52AA6E4}">
-                <adec:decorative xmlns:adec="http://schemas.microsoft.com/office/drawing/2017/decorative" val="1"/>
+                <adec:decorative xmlns:adec="http://schemas.microsoft.com/office/drawing/2017/decorative" xmlns="" val="1"/>
               </a:ext>
             </a:extLst>
           </p:cNvPr>
@@ -13984,7 +13913,7 @@
                 <a16:creationId xmlns:a16="http://schemas.microsoft.com/office/drawing/2014/main" id="{944560DA-CFF0-4C77-A23E-791E44450FED}"/>
               </a:ext>
               <a:ext uri="{C183D7F6-B498-43B3-948B-1728B52AA6E4}">
-                <adec:decorative xmlns:adec="http://schemas.microsoft.com/office/drawing/2017/decorative" val="1"/>
+                <adec:decorative xmlns:adec="http://schemas.microsoft.com/office/drawing/2017/decorative" xmlns="" val="1"/>
               </a:ext>
             </a:extLst>
           </p:cNvPr>
@@ -14051,7 +13980,7 @@
                 <a16:creationId xmlns:a16="http://schemas.microsoft.com/office/drawing/2014/main" id="{B0E58207-510F-4536-88A1-FD6232BC16B3}"/>
               </a:ext>
               <a:ext uri="{C183D7F6-B498-43B3-948B-1728B52AA6E4}">
-                <adec:decorative xmlns:adec="http://schemas.microsoft.com/office/drawing/2017/decorative" val="1"/>
+                <adec:decorative xmlns:adec="http://schemas.microsoft.com/office/drawing/2017/decorative" xmlns="" val="1"/>
               </a:ext>
             </a:extLst>
           </p:cNvPr>
@@ -15301,7 +15230,7 @@
                 <a16:creationId xmlns:a16="http://schemas.microsoft.com/office/drawing/2014/main" id="{081D8FED-CAAF-4417-8076-B38BC0ED0CD7}"/>
               </a:ext>
               <a:ext uri="{C183D7F6-B498-43B3-948B-1728B52AA6E4}">
-                <adec:decorative xmlns:adec="http://schemas.microsoft.com/office/drawing/2017/decorative" val="1"/>
+                <adec:decorative xmlns:adec="http://schemas.microsoft.com/office/drawing/2017/decorative" xmlns="" val="1"/>
               </a:ext>
             </a:extLst>
           </p:cNvPr>
@@ -15379,7 +15308,7 @@
                 <a16:creationId xmlns:a16="http://schemas.microsoft.com/office/drawing/2014/main" id="{CA4295ED-8081-4C89-ADA5-B91B94C8224D}"/>
               </a:ext>
               <a:ext uri="{C183D7F6-B498-43B3-948B-1728B52AA6E4}">
-                <adec:decorative xmlns:adec="http://schemas.microsoft.com/office/drawing/2017/decorative" val="1"/>
+                <adec:decorative xmlns:adec="http://schemas.microsoft.com/office/drawing/2017/decorative" xmlns="" val="1"/>
               </a:ext>
             </a:extLst>
           </p:cNvPr>
@@ -15443,7 +15372,7 @@
           <p:nvPr/>
         </p:nvPicPr>
         <p:blipFill>
-          <a:blip r:embed="rId3">
+          <a:blip r:embed="rId3" cstate="hqprint">
             <a:extLst>
               <a:ext uri="{28A0092B-C50C-407E-A947-70E740481C1C}">
                 <a14:useLocalDpi xmlns:a14="http://schemas.microsoft.com/office/drawing/2010/main" val="0"/>
@@ -15473,7 +15402,7 @@
                 <a16:creationId xmlns:a16="http://schemas.microsoft.com/office/drawing/2014/main" id="{671B39CF-CF2D-484F-9313-5A6F59F2BDE8}"/>
               </a:ext>
               <a:ext uri="{C183D7F6-B498-43B3-948B-1728B52AA6E4}">
-                <adec:decorative xmlns:adec="http://schemas.microsoft.com/office/drawing/2017/decorative" val="1"/>
+                <adec:decorative xmlns:adec="http://schemas.microsoft.com/office/drawing/2017/decorative" xmlns="" val="1"/>
               </a:ext>
             </a:extLst>
           </p:cNvPr>
@@ -15533,7 +15462,7 @@
                 <a16:creationId xmlns:a16="http://schemas.microsoft.com/office/drawing/2014/main" id="{1E5D3549-CD3A-4813-97D3-2911C66BA515}"/>
               </a:ext>
               <a:ext uri="{C183D7F6-B498-43B3-948B-1728B52AA6E4}">
-                <adec:decorative xmlns:adec="http://schemas.microsoft.com/office/drawing/2017/decorative" val="1"/>
+                <adec:decorative xmlns:adec="http://schemas.microsoft.com/office/drawing/2017/decorative" xmlns="" val="1"/>
               </a:ext>
             </a:extLst>
           </p:cNvPr>
@@ -15760,94 +15689,6 @@
           </a:p>
         </p:txBody>
       </p:sp>
-      <p:sp>
-        <p:nvSpPr>
-          <p:cNvPr id="6" name="TextBox 5">
-            <a:extLst>
-              <a:ext uri="{FF2B5EF4-FFF2-40B4-BE49-F238E27FC236}">
-                <a16:creationId xmlns:a16="http://schemas.microsoft.com/office/drawing/2014/main" id="{95B49AD3-AB76-4222-A0D8-CC0F9BB2CFC9}"/>
-              </a:ext>
-            </a:extLst>
-          </p:cNvPr>
-          <p:cNvSpPr txBox="1"/>
-          <p:nvPr/>
-        </p:nvSpPr>
-        <p:spPr>
-          <a:xfrm>
-            <a:off x="696286" y="1184319"/>
-            <a:ext cx="2340529" cy="1231106"/>
-          </a:xfrm>
-          <a:prstGeom prst="rect">
-            <a:avLst/>
-          </a:prstGeom>
-          <a:solidFill>
-            <a:schemeClr val="bg1"/>
-          </a:solidFill>
-        </p:spPr>
-        <p:txBody>
-          <a:bodyPr wrap="square" rtlCol="0">
-            <a:spAutoFit/>
-          </a:bodyPr>
-          <a:lstStyle/>
-          <a:p>
-            <a:pPr algn="ctr"/>
-            <a:r>
-              <a:rPr lang="ru-RU" dirty="0"/>
-              <a:t>Изображение для всех пользователей</a:t>
-            </a:r>
-          </a:p>
-          <a:p>
-            <a:endParaRPr lang="ru-RU" dirty="0"/>
-          </a:p>
-          <a:p>
-            <a:endParaRPr lang="ru-KZ" sz="2000" dirty="0"/>
-          </a:p>
-        </p:txBody>
-      </p:sp>
-      <p:sp>
-        <p:nvSpPr>
-          <p:cNvPr id="8" name="TextBox 7">
-            <a:extLst>
-              <a:ext uri="{FF2B5EF4-FFF2-40B4-BE49-F238E27FC236}">
-                <a16:creationId xmlns:a16="http://schemas.microsoft.com/office/drawing/2014/main" id="{8F798DC5-6AF0-4C1C-B8FB-69D3B72A2F23}"/>
-              </a:ext>
-            </a:extLst>
-          </p:cNvPr>
-          <p:cNvSpPr txBox="1"/>
-          <p:nvPr/>
-        </p:nvSpPr>
-        <p:spPr>
-          <a:xfrm>
-            <a:off x="6521977" y="1244440"/>
-            <a:ext cx="2672357" cy="1415772"/>
-          </a:xfrm>
-          <a:prstGeom prst="rect">
-            <a:avLst/>
-          </a:prstGeom>
-          <a:solidFill>
-            <a:schemeClr val="bg1"/>
-          </a:solidFill>
-        </p:spPr>
-        <p:txBody>
-          <a:bodyPr wrap="square" rtlCol="0">
-            <a:spAutoFit/>
-          </a:bodyPr>
-          <a:lstStyle/>
-          <a:p>
-            <a:pPr algn="ctr"/>
-            <a:r>
-              <a:rPr lang="ru-RU" dirty="0"/>
-              <a:t>Изображение для всех пользователей</a:t>
-            </a:r>
-          </a:p>
-          <a:p>
-            <a:endParaRPr lang="ru-RU" dirty="0"/>
-          </a:p>
-          <a:p>
-            <a:endParaRPr lang="ru-KZ" sz="3200" dirty="0"/>
-          </a:p>
-        </p:txBody>
-      </p:sp>
       <p:pic>
         <p:nvPicPr>
           <p:cNvPr id="9" name="Рисунок 8">
@@ -15986,6 +15827,66 @@
           </a:p>
         </p:txBody>
       </p:sp>
+      <p:pic>
+        <p:nvPicPr>
+          <p:cNvPr id="7" name="Рисунок 6"/>
+          <p:cNvPicPr>
+            <a:picLocks noChangeAspect="1"/>
+          </p:cNvPicPr>
+          <p:nvPr/>
+        </p:nvPicPr>
+        <p:blipFill>
+          <a:blip r:embed="rId6" cstate="hqprint">
+            <a:extLst>
+              <a:ext uri="{28A0092B-C50C-407E-A947-70E740481C1C}">
+                <a14:useLocalDpi xmlns:a14="http://schemas.microsoft.com/office/drawing/2010/main" val="0"/>
+              </a:ext>
+            </a:extLst>
+          </a:blip>
+          <a:stretch>
+            <a:fillRect/>
+          </a:stretch>
+        </p:blipFill>
+        <p:spPr>
+          <a:xfrm>
+            <a:off x="891540" y="1171053"/>
+            <a:ext cx="2062797" cy="1145427"/>
+          </a:xfrm>
+          <a:prstGeom prst="rect">
+            <a:avLst/>
+          </a:prstGeom>
+        </p:spPr>
+      </p:pic>
+      <p:pic>
+        <p:nvPicPr>
+          <p:cNvPr id="13" name="Рисунок 12"/>
+          <p:cNvPicPr>
+            <a:picLocks noChangeAspect="1"/>
+          </p:cNvPicPr>
+          <p:nvPr/>
+        </p:nvPicPr>
+        <p:blipFill>
+          <a:blip r:embed="rId7" cstate="hqprint">
+            <a:extLst>
+              <a:ext uri="{28A0092B-C50C-407E-A947-70E740481C1C}">
+                <a14:useLocalDpi xmlns:a14="http://schemas.microsoft.com/office/drawing/2010/main" val="0"/>
+              </a:ext>
+            </a:extLst>
+          </a:blip>
+          <a:stretch>
+            <a:fillRect/>
+          </a:stretch>
+        </p:blipFill>
+        <p:spPr>
+          <a:xfrm>
+            <a:off x="6579682" y="1229102"/>
+            <a:ext cx="2610038" cy="1468146"/>
+          </a:xfrm>
+          <a:prstGeom prst="rect">
+            <a:avLst/>
+          </a:prstGeom>
+        </p:spPr>
+      </p:pic>
     </p:spTree>
     <p:extLst>
       <p:ext uri="{BB962C8B-B14F-4D97-AF65-F5344CB8AC3E}">
@@ -16057,7 +15958,7 @@
                 <a16:creationId xmlns:a16="http://schemas.microsoft.com/office/drawing/2014/main" id="{D0986099-F5F2-4E8B-BE17-81194861A00C}"/>
               </a:ext>
               <a:ext uri="{C183D7F6-B498-43B3-948B-1728B52AA6E4}">
-                <adec:decorative xmlns:adec="http://schemas.microsoft.com/office/drawing/2017/decorative" val="1"/>
+                <adec:decorative xmlns:adec="http://schemas.microsoft.com/office/drawing/2017/decorative" xmlns="" val="1"/>
               </a:ext>
             </a:extLst>
           </p:cNvPr>
@@ -16157,6 +16058,17 @@
               </a:rPr>
               <a:t>Анализ проекта</a:t>
             </a:r>
+            <a:r>
+              <a:rPr lang="ru-RU" sz="2800" dirty="0">
+                <a:solidFill>
+                  <a:schemeClr val="tx1">
+                    <a:lumMod val="75000"/>
+                    <a:lumOff val="25000"/>
+                  </a:schemeClr>
+                </a:solidFill>
+              </a:rPr>
+              <a:t/>
+            </a:r>
             <a:br>
               <a:rPr lang="ru-RU" sz="2800" dirty="0">
                 <a:solidFill>
@@ -16186,7 +16098,7 @@
                 <a16:creationId xmlns:a16="http://schemas.microsoft.com/office/drawing/2014/main" id="{83E690F4-843A-47A5-8620-4FB01C0D8E68}"/>
               </a:ext>
               <a:ext uri="{C183D7F6-B498-43B3-948B-1728B52AA6E4}">
-                <adec:decorative xmlns:adec="http://schemas.microsoft.com/office/drawing/2017/decorative" val="1"/>
+                <adec:decorative xmlns:adec="http://schemas.microsoft.com/office/drawing/2017/decorative" xmlns="" val="1"/>
               </a:ext>
             </a:extLst>
           </p:cNvPr>
@@ -16235,7 +16147,7 @@
                 <a16:creationId xmlns:a16="http://schemas.microsoft.com/office/drawing/2014/main" id="{9F23A462-D581-4451-A275-D8FA412E142C}"/>
               </a:ext>
               <a:ext uri="{C183D7F6-B498-43B3-948B-1728B52AA6E4}">
-                <adec:decorative xmlns:adec="http://schemas.microsoft.com/office/drawing/2017/decorative" val="1"/>
+                <adec:decorative xmlns:adec="http://schemas.microsoft.com/office/drawing/2017/decorative" xmlns="" val="1"/>
               </a:ext>
             </a:extLst>
           </p:cNvPr>
@@ -16290,7 +16202,7 @@
                 <a16:creationId xmlns:a16="http://schemas.microsoft.com/office/drawing/2014/main" id="{3FAD125B-9A3B-49A4-B9EC-C8A6D3CF9CBF}"/>
               </a:ext>
               <a:ext uri="{C183D7F6-B498-43B3-948B-1728B52AA6E4}">
-                <adec:decorative xmlns:adec="http://schemas.microsoft.com/office/drawing/2017/decorative" val="1"/>
+                <adec:decorative xmlns:adec="http://schemas.microsoft.com/office/drawing/2017/decorative" xmlns="" val="1"/>
               </a:ext>
             </a:extLst>
           </p:cNvPr>
@@ -16345,7 +16257,7 @@
                 <a16:creationId xmlns:a16="http://schemas.microsoft.com/office/drawing/2014/main" id="{233E4AB5-6FC1-4454-9421-850EF5A4ADF3}"/>
               </a:ext>
               <a:ext uri="{C183D7F6-B498-43B3-948B-1728B52AA6E4}">
-                <adec:decorative xmlns:adec="http://schemas.microsoft.com/office/drawing/2017/decorative" val="1"/>
+                <adec:decorative xmlns:adec="http://schemas.microsoft.com/office/drawing/2017/decorative" xmlns="" val="1"/>
               </a:ext>
             </a:extLst>
           </p:cNvPr>
@@ -16402,7 +16314,7 @@
                 <a16:creationId xmlns:a16="http://schemas.microsoft.com/office/drawing/2014/main" id="{40123448-0B37-4226-B26C-A3081E6142FF}"/>
               </a:ext>
               <a:ext uri="{C183D7F6-B498-43B3-948B-1728B52AA6E4}">
-                <adec:decorative xmlns:adec="http://schemas.microsoft.com/office/drawing/2017/decorative" val="1"/>
+                <adec:decorative xmlns:adec="http://schemas.microsoft.com/office/drawing/2017/decorative" xmlns="" val="1"/>
               </a:ext>
             </a:extLst>
           </p:cNvPr>
@@ -16459,7 +16371,7 @@
                 <a16:creationId xmlns:a16="http://schemas.microsoft.com/office/drawing/2014/main" id="{355211EE-8286-42CD-A4AF-EDD1186B28A3}"/>
               </a:ext>
               <a:ext uri="{C183D7F6-B498-43B3-948B-1728B52AA6E4}">
-                <adec:decorative xmlns:adec="http://schemas.microsoft.com/office/drawing/2017/decorative" val="1"/>
+                <adec:decorative xmlns:adec="http://schemas.microsoft.com/office/drawing/2017/decorative" xmlns="" val="1"/>
               </a:ext>
             </a:extLst>
           </p:cNvPr>
@@ -16514,7 +16426,7 @@
                 <a16:creationId xmlns:a16="http://schemas.microsoft.com/office/drawing/2014/main" id="{D3287700-63E7-4098-B825-B123C11134C1}"/>
               </a:ext>
               <a:ext uri="{C183D7F6-B498-43B3-948B-1728B52AA6E4}">
-                <adec:decorative xmlns:adec="http://schemas.microsoft.com/office/drawing/2017/decorative" val="1"/>
+                <adec:decorative xmlns:adec="http://schemas.microsoft.com/office/drawing/2017/decorative" xmlns="" val="1"/>
               </a:ext>
             </a:extLst>
           </p:cNvPr>
@@ -16569,7 +16481,7 @@
                 <a16:creationId xmlns:a16="http://schemas.microsoft.com/office/drawing/2014/main" id="{69943F00-C6CB-4F10-A02B-801F37984D43}"/>
               </a:ext>
               <a:ext uri="{C183D7F6-B498-43B3-948B-1728B52AA6E4}">
-                <adec:decorative xmlns:adec="http://schemas.microsoft.com/office/drawing/2017/decorative" val="1"/>
+                <adec:decorative xmlns:adec="http://schemas.microsoft.com/office/drawing/2017/decorative" xmlns="" val="1"/>
               </a:ext>
             </a:extLst>
           </p:cNvPr>
@@ -16624,7 +16536,7 @@
                 <a16:creationId xmlns:a16="http://schemas.microsoft.com/office/drawing/2014/main" id="{78C71AAC-D0D2-4BBF-B302-54163A284EC6}"/>
               </a:ext>
               <a:ext uri="{C183D7F6-B498-43B3-948B-1728B52AA6E4}">
-                <adec:decorative xmlns:adec="http://schemas.microsoft.com/office/drawing/2017/decorative" val="1"/>
+                <adec:decorative xmlns:adec="http://schemas.microsoft.com/office/drawing/2017/decorative" xmlns="" val="1"/>
               </a:ext>
             </a:extLst>
           </p:cNvPr>
@@ -16673,7 +16585,7 @@
                 <a16:creationId xmlns:a16="http://schemas.microsoft.com/office/drawing/2014/main" id="{331AB5AC-284A-472B-B8E5-2F198F4E96D7}"/>
               </a:ext>
               <a:ext uri="{C183D7F6-B498-43B3-948B-1728B52AA6E4}">
-                <adec:decorative xmlns:adec="http://schemas.microsoft.com/office/drawing/2017/decorative" val="1"/>
+                <adec:decorative xmlns:adec="http://schemas.microsoft.com/office/drawing/2017/decorative" xmlns="" val="1"/>
               </a:ext>
             </a:extLst>
           </p:cNvPr>
@@ -16721,7 +16633,7 @@
                 <a16:creationId xmlns:a16="http://schemas.microsoft.com/office/drawing/2014/main" id="{91394D4E-BC7A-418D-B233-6C374456AEAE}"/>
               </a:ext>
               <a:ext uri="{C183D7F6-B498-43B3-948B-1728B52AA6E4}">
-                <adec:decorative xmlns:adec="http://schemas.microsoft.com/office/drawing/2017/decorative" val="1"/>
+                <adec:decorative xmlns:adec="http://schemas.microsoft.com/office/drawing/2017/decorative" xmlns="" val="1"/>
               </a:ext>
             </a:extLst>
           </p:cNvPr>
@@ -16770,7 +16682,7 @@
                 <a16:creationId xmlns:a16="http://schemas.microsoft.com/office/drawing/2014/main" id="{61AAA85B-D8C7-43BE-844A-625265015123}"/>
               </a:ext>
               <a:ext uri="{C183D7F6-B498-43B3-948B-1728B52AA6E4}">
-                <adec:decorative xmlns:adec="http://schemas.microsoft.com/office/drawing/2017/decorative" val="1"/>
+                <adec:decorative xmlns:adec="http://schemas.microsoft.com/office/drawing/2017/decorative" xmlns="" val="1"/>
               </a:ext>
             </a:extLst>
           </p:cNvPr>
@@ -16819,7 +16731,7 @@
                 <a16:creationId xmlns:a16="http://schemas.microsoft.com/office/drawing/2014/main" id="{4741AA56-D9ED-492E-8385-5CB8274B1286}"/>
               </a:ext>
               <a:ext uri="{C183D7F6-B498-43B3-948B-1728B52AA6E4}">
-                <adec:decorative xmlns:adec="http://schemas.microsoft.com/office/drawing/2017/decorative" val="1"/>
+                <adec:decorative xmlns:adec="http://schemas.microsoft.com/office/drawing/2017/decorative" xmlns="" val="1"/>
               </a:ext>
             </a:extLst>
           </p:cNvPr>
@@ -17135,1091 +17047,6 @@
           </a:p>
         </p:txBody>
       </p:sp>
-      <p:sp>
-        <p:nvSpPr>
-          <p:cNvPr id="90" name="Прямоугольник 89">
-            <a:extLst>
-              <a:ext uri="{FF2B5EF4-FFF2-40B4-BE49-F238E27FC236}">
-                <a16:creationId xmlns:a16="http://schemas.microsoft.com/office/drawing/2014/main" id="{79B46693-ED1F-429F-9B11-2794939E3B99}"/>
-              </a:ext>
-            </a:extLst>
-          </p:cNvPr>
-          <p:cNvSpPr/>
-          <p:nvPr/>
-        </p:nvSpPr>
-        <p:spPr>
-          <a:xfrm>
-            <a:off x="6614715" y="4621418"/>
-            <a:ext cx="1348582" cy="487313"/>
-          </a:xfrm>
-          <a:prstGeom prst="rect">
-            <a:avLst/>
-          </a:prstGeom>
-        </p:spPr>
-        <p:txBody>
-          <a:bodyPr wrap="square" lIns="0" tIns="0" rIns="0" bIns="0" rtlCol="0" anchor="ctr">
-            <a:spAutoFit/>
-          </a:bodyPr>
-          <a:lstStyle/>
-          <a:p>
-            <a:pPr algn="ctr" rtl="0">
-              <a:lnSpc>
-                <a:spcPts val="1900"/>
-              </a:lnSpc>
-            </a:pPr>
-            <a:r>
-              <a:rPr lang="ru-RU" sz="1400" dirty="0" err="1">
-                <a:solidFill>
-                  <a:schemeClr val="tx1">
-                    <a:lumMod val="75000"/>
-                    <a:lumOff val="25000"/>
-                  </a:schemeClr>
-                </a:solidFill>
-                <a:cs typeface="Segoe UI" panose="020B0502040204020203" pitchFamily="34" charset="0"/>
-              </a:rPr>
-              <a:t>Lorem</a:t>
-            </a:r>
-            <a:r>
-              <a:rPr lang="ru-RU" sz="1400" dirty="0">
-                <a:solidFill>
-                  <a:schemeClr val="tx1">
-                    <a:lumMod val="75000"/>
-                    <a:lumOff val="25000"/>
-                  </a:schemeClr>
-                </a:solidFill>
-                <a:cs typeface="Segoe UI" panose="020B0502040204020203" pitchFamily="34" charset="0"/>
-              </a:rPr>
-              <a:t> </a:t>
-            </a:r>
-            <a:r>
-              <a:rPr lang="ru-RU" sz="1400" dirty="0" err="1">
-                <a:solidFill>
-                  <a:schemeClr val="tx1">
-                    <a:lumMod val="75000"/>
-                    <a:lumOff val="25000"/>
-                  </a:schemeClr>
-                </a:solidFill>
-                <a:cs typeface="Segoe UI" panose="020B0502040204020203" pitchFamily="34" charset="0"/>
-              </a:rPr>
-              <a:t>ipsum</a:t>
-            </a:r>
-            <a:r>
-              <a:rPr lang="ru-RU" sz="1400" dirty="0">
-                <a:solidFill>
-                  <a:schemeClr val="tx1">
-                    <a:lumMod val="75000"/>
-                    <a:lumOff val="25000"/>
-                  </a:schemeClr>
-                </a:solidFill>
-                <a:cs typeface="Segoe UI" panose="020B0502040204020203" pitchFamily="34" charset="0"/>
-              </a:rPr>
-              <a:t> </a:t>
-            </a:r>
-            <a:r>
-              <a:rPr lang="ru-RU" sz="1400" dirty="0" err="1">
-                <a:solidFill>
-                  <a:schemeClr val="tx1">
-                    <a:lumMod val="75000"/>
-                    <a:lumOff val="25000"/>
-                  </a:schemeClr>
-                </a:solidFill>
-                <a:cs typeface="Segoe UI" panose="020B0502040204020203" pitchFamily="34" charset="0"/>
-              </a:rPr>
-              <a:t>dolor</a:t>
-            </a:r>
-            <a:r>
-              <a:rPr lang="ru-RU" sz="1400" dirty="0">
-                <a:solidFill>
-                  <a:schemeClr val="tx1">
-                    <a:lumMod val="75000"/>
-                    <a:lumOff val="25000"/>
-                  </a:schemeClr>
-                </a:solidFill>
-                <a:cs typeface="Segoe UI" panose="020B0502040204020203" pitchFamily="34" charset="0"/>
-              </a:rPr>
-              <a:t> </a:t>
-            </a:r>
-            <a:r>
-              <a:rPr lang="ru-RU" sz="1400" dirty="0" err="1">
-                <a:solidFill>
-                  <a:schemeClr val="tx1">
-                    <a:lumMod val="75000"/>
-                    <a:lumOff val="25000"/>
-                  </a:schemeClr>
-                </a:solidFill>
-                <a:cs typeface="Segoe UI" panose="020B0502040204020203" pitchFamily="34" charset="0"/>
-              </a:rPr>
-              <a:t>sit</a:t>
-            </a:r>
-            <a:r>
-              <a:rPr lang="ru-RU" sz="1400" dirty="0">
-                <a:solidFill>
-                  <a:schemeClr val="tx1">
-                    <a:lumMod val="75000"/>
-                    <a:lumOff val="25000"/>
-                  </a:schemeClr>
-                </a:solidFill>
-                <a:cs typeface="Segoe UI" panose="020B0502040204020203" pitchFamily="34" charset="0"/>
-              </a:rPr>
-              <a:t> </a:t>
-            </a:r>
-            <a:r>
-              <a:rPr lang="ru-RU" sz="1400" dirty="0" err="1">
-                <a:solidFill>
-                  <a:schemeClr val="tx1">
-                    <a:lumMod val="75000"/>
-                    <a:lumOff val="25000"/>
-                  </a:schemeClr>
-                </a:solidFill>
-                <a:cs typeface="Segoe UI" panose="020B0502040204020203" pitchFamily="34" charset="0"/>
-              </a:rPr>
-              <a:t>amet</a:t>
-            </a:r>
-            <a:r>
-              <a:rPr lang="ru-RU" sz="1400" dirty="0">
-                <a:solidFill>
-                  <a:schemeClr val="tx1">
-                    <a:lumMod val="75000"/>
-                    <a:lumOff val="25000"/>
-                  </a:schemeClr>
-                </a:solidFill>
-                <a:cs typeface="Segoe UI" panose="020B0502040204020203" pitchFamily="34" charset="0"/>
-              </a:rPr>
-              <a:t>.</a:t>
-            </a:r>
-          </a:p>
-        </p:txBody>
-      </p:sp>
-      <p:sp>
-        <p:nvSpPr>
-          <p:cNvPr id="91" name="Прямоугольник 90">
-            <a:extLst>
-              <a:ext uri="{FF2B5EF4-FFF2-40B4-BE49-F238E27FC236}">
-                <a16:creationId xmlns:a16="http://schemas.microsoft.com/office/drawing/2014/main" id="{0F8D1DEA-0363-4C10-925D-1D68E14CCEF4}"/>
-              </a:ext>
-            </a:extLst>
-          </p:cNvPr>
-          <p:cNvSpPr/>
-          <p:nvPr/>
-        </p:nvSpPr>
-        <p:spPr>
-          <a:xfrm>
-            <a:off x="4228703" y="4621418"/>
-            <a:ext cx="1348582" cy="487313"/>
-          </a:xfrm>
-          <a:prstGeom prst="rect">
-            <a:avLst/>
-          </a:prstGeom>
-        </p:spPr>
-        <p:txBody>
-          <a:bodyPr wrap="square" lIns="0" tIns="0" rIns="0" bIns="0" rtlCol="0" anchor="ctr">
-            <a:spAutoFit/>
-          </a:bodyPr>
-          <a:lstStyle/>
-          <a:p>
-            <a:pPr algn="ctr" rtl="0">
-              <a:lnSpc>
-                <a:spcPts val="1900"/>
-              </a:lnSpc>
-            </a:pPr>
-            <a:r>
-              <a:rPr lang="ru-RU" sz="1400" dirty="0" err="1">
-                <a:solidFill>
-                  <a:schemeClr val="tx1">
-                    <a:lumMod val="75000"/>
-                    <a:lumOff val="25000"/>
-                  </a:schemeClr>
-                </a:solidFill>
-                <a:cs typeface="Segoe UI" panose="020B0502040204020203" pitchFamily="34" charset="0"/>
-              </a:rPr>
-              <a:t>Lorem</a:t>
-            </a:r>
-            <a:r>
-              <a:rPr lang="ru-RU" sz="1400" dirty="0">
-                <a:solidFill>
-                  <a:schemeClr val="tx1">
-                    <a:lumMod val="75000"/>
-                    <a:lumOff val="25000"/>
-                  </a:schemeClr>
-                </a:solidFill>
-                <a:cs typeface="Segoe UI" panose="020B0502040204020203" pitchFamily="34" charset="0"/>
-              </a:rPr>
-              <a:t> </a:t>
-            </a:r>
-            <a:r>
-              <a:rPr lang="ru-RU" sz="1400" dirty="0" err="1">
-                <a:solidFill>
-                  <a:schemeClr val="tx1">
-                    <a:lumMod val="75000"/>
-                    <a:lumOff val="25000"/>
-                  </a:schemeClr>
-                </a:solidFill>
-                <a:cs typeface="Segoe UI" panose="020B0502040204020203" pitchFamily="34" charset="0"/>
-              </a:rPr>
-              <a:t>ipsum</a:t>
-            </a:r>
-            <a:r>
-              <a:rPr lang="ru-RU" sz="1400" dirty="0">
-                <a:solidFill>
-                  <a:schemeClr val="tx1">
-                    <a:lumMod val="75000"/>
-                    <a:lumOff val="25000"/>
-                  </a:schemeClr>
-                </a:solidFill>
-                <a:cs typeface="Segoe UI" panose="020B0502040204020203" pitchFamily="34" charset="0"/>
-              </a:rPr>
-              <a:t> </a:t>
-            </a:r>
-            <a:r>
-              <a:rPr lang="ru-RU" sz="1400" dirty="0" err="1">
-                <a:solidFill>
-                  <a:schemeClr val="tx1">
-                    <a:lumMod val="75000"/>
-                    <a:lumOff val="25000"/>
-                  </a:schemeClr>
-                </a:solidFill>
-                <a:cs typeface="Segoe UI" panose="020B0502040204020203" pitchFamily="34" charset="0"/>
-              </a:rPr>
-              <a:t>dolor</a:t>
-            </a:r>
-            <a:r>
-              <a:rPr lang="ru-RU" sz="1400" dirty="0">
-                <a:solidFill>
-                  <a:schemeClr val="tx1">
-                    <a:lumMod val="75000"/>
-                    <a:lumOff val="25000"/>
-                  </a:schemeClr>
-                </a:solidFill>
-                <a:cs typeface="Segoe UI" panose="020B0502040204020203" pitchFamily="34" charset="0"/>
-              </a:rPr>
-              <a:t> </a:t>
-            </a:r>
-            <a:r>
-              <a:rPr lang="ru-RU" sz="1400" dirty="0" err="1">
-                <a:solidFill>
-                  <a:schemeClr val="tx1">
-                    <a:lumMod val="75000"/>
-                    <a:lumOff val="25000"/>
-                  </a:schemeClr>
-                </a:solidFill>
-                <a:cs typeface="Segoe UI" panose="020B0502040204020203" pitchFamily="34" charset="0"/>
-              </a:rPr>
-              <a:t>sit</a:t>
-            </a:r>
-            <a:r>
-              <a:rPr lang="ru-RU" sz="1400" dirty="0">
-                <a:solidFill>
-                  <a:schemeClr val="tx1">
-                    <a:lumMod val="75000"/>
-                    <a:lumOff val="25000"/>
-                  </a:schemeClr>
-                </a:solidFill>
-                <a:cs typeface="Segoe UI" panose="020B0502040204020203" pitchFamily="34" charset="0"/>
-              </a:rPr>
-              <a:t> </a:t>
-            </a:r>
-            <a:r>
-              <a:rPr lang="ru-RU" sz="1400" dirty="0" err="1">
-                <a:solidFill>
-                  <a:schemeClr val="tx1">
-                    <a:lumMod val="75000"/>
-                    <a:lumOff val="25000"/>
-                  </a:schemeClr>
-                </a:solidFill>
-                <a:cs typeface="Segoe UI" panose="020B0502040204020203" pitchFamily="34" charset="0"/>
-              </a:rPr>
-              <a:t>amet</a:t>
-            </a:r>
-            <a:r>
-              <a:rPr lang="ru-RU" sz="1400" dirty="0">
-                <a:solidFill>
-                  <a:schemeClr val="tx1">
-                    <a:lumMod val="75000"/>
-                    <a:lumOff val="25000"/>
-                  </a:schemeClr>
-                </a:solidFill>
-                <a:cs typeface="Segoe UI" panose="020B0502040204020203" pitchFamily="34" charset="0"/>
-              </a:rPr>
-              <a:t>.</a:t>
-            </a:r>
-          </a:p>
-        </p:txBody>
-      </p:sp>
-      <p:sp>
-        <p:nvSpPr>
-          <p:cNvPr id="87" name="Прямоугольник 86">
-            <a:extLst>
-              <a:ext uri="{FF2B5EF4-FFF2-40B4-BE49-F238E27FC236}">
-                <a16:creationId xmlns:a16="http://schemas.microsoft.com/office/drawing/2014/main" id="{D927301F-4FAD-47A6-987B-1D9C411B7CC1}"/>
-              </a:ext>
-            </a:extLst>
-          </p:cNvPr>
-          <p:cNvSpPr/>
-          <p:nvPr/>
-        </p:nvSpPr>
-        <p:spPr>
-          <a:xfrm>
-            <a:off x="10576718" y="1657927"/>
-            <a:ext cx="1348582" cy="487313"/>
-          </a:xfrm>
-          <a:prstGeom prst="rect">
-            <a:avLst/>
-          </a:prstGeom>
-        </p:spPr>
-        <p:txBody>
-          <a:bodyPr wrap="square" lIns="0" tIns="0" rIns="0" bIns="0" rtlCol="0" anchor="ctr">
-            <a:spAutoFit/>
-          </a:bodyPr>
-          <a:lstStyle/>
-          <a:p>
-            <a:pPr rtl="0">
-              <a:lnSpc>
-                <a:spcPts val="1900"/>
-              </a:lnSpc>
-            </a:pPr>
-            <a:r>
-              <a:rPr lang="ru-RU" sz="1400" dirty="0" err="1">
-                <a:solidFill>
-                  <a:schemeClr val="tx1">
-                    <a:lumMod val="75000"/>
-                    <a:lumOff val="25000"/>
-                  </a:schemeClr>
-                </a:solidFill>
-                <a:cs typeface="Segoe UI" panose="020B0502040204020203" pitchFamily="34" charset="0"/>
-              </a:rPr>
-              <a:t>Lorem</a:t>
-            </a:r>
-            <a:r>
-              <a:rPr lang="ru-RU" sz="1400" dirty="0">
-                <a:solidFill>
-                  <a:schemeClr val="tx1">
-                    <a:lumMod val="75000"/>
-                    <a:lumOff val="25000"/>
-                  </a:schemeClr>
-                </a:solidFill>
-                <a:cs typeface="Segoe UI" panose="020B0502040204020203" pitchFamily="34" charset="0"/>
-              </a:rPr>
-              <a:t> </a:t>
-            </a:r>
-            <a:r>
-              <a:rPr lang="ru-RU" sz="1400" dirty="0" err="1">
-                <a:solidFill>
-                  <a:schemeClr val="tx1">
-                    <a:lumMod val="75000"/>
-                    <a:lumOff val="25000"/>
-                  </a:schemeClr>
-                </a:solidFill>
-                <a:cs typeface="Segoe UI" panose="020B0502040204020203" pitchFamily="34" charset="0"/>
-              </a:rPr>
-              <a:t>ipsum</a:t>
-            </a:r>
-            <a:r>
-              <a:rPr lang="ru-RU" sz="1400" dirty="0">
-                <a:solidFill>
-                  <a:schemeClr val="tx1">
-                    <a:lumMod val="75000"/>
-                    <a:lumOff val="25000"/>
-                  </a:schemeClr>
-                </a:solidFill>
-                <a:cs typeface="Segoe UI" panose="020B0502040204020203" pitchFamily="34" charset="0"/>
-              </a:rPr>
-              <a:t> </a:t>
-            </a:r>
-            <a:r>
-              <a:rPr lang="ru-RU" sz="1400" dirty="0" err="1">
-                <a:solidFill>
-                  <a:schemeClr val="tx1">
-                    <a:lumMod val="75000"/>
-                    <a:lumOff val="25000"/>
-                  </a:schemeClr>
-                </a:solidFill>
-                <a:cs typeface="Segoe UI" panose="020B0502040204020203" pitchFamily="34" charset="0"/>
-              </a:rPr>
-              <a:t>dolor</a:t>
-            </a:r>
-            <a:r>
-              <a:rPr lang="ru-RU" sz="1400" dirty="0">
-                <a:solidFill>
-                  <a:schemeClr val="tx1">
-                    <a:lumMod val="75000"/>
-                    <a:lumOff val="25000"/>
-                  </a:schemeClr>
-                </a:solidFill>
-                <a:cs typeface="Segoe UI" panose="020B0502040204020203" pitchFamily="34" charset="0"/>
-              </a:rPr>
-              <a:t> </a:t>
-            </a:r>
-            <a:r>
-              <a:rPr lang="ru-RU" sz="1400" dirty="0" err="1">
-                <a:solidFill>
-                  <a:schemeClr val="tx1">
-                    <a:lumMod val="75000"/>
-                    <a:lumOff val="25000"/>
-                  </a:schemeClr>
-                </a:solidFill>
-                <a:cs typeface="Segoe UI" panose="020B0502040204020203" pitchFamily="34" charset="0"/>
-              </a:rPr>
-              <a:t>sit</a:t>
-            </a:r>
-            <a:r>
-              <a:rPr lang="ru-RU" sz="1400" dirty="0">
-                <a:solidFill>
-                  <a:schemeClr val="tx1">
-                    <a:lumMod val="75000"/>
-                    <a:lumOff val="25000"/>
-                  </a:schemeClr>
-                </a:solidFill>
-                <a:cs typeface="Segoe UI" panose="020B0502040204020203" pitchFamily="34" charset="0"/>
-              </a:rPr>
-              <a:t> </a:t>
-            </a:r>
-            <a:r>
-              <a:rPr lang="ru-RU" sz="1400" dirty="0" err="1">
-                <a:solidFill>
-                  <a:schemeClr val="tx1">
-                    <a:lumMod val="75000"/>
-                    <a:lumOff val="25000"/>
-                  </a:schemeClr>
-                </a:solidFill>
-                <a:cs typeface="Segoe UI" panose="020B0502040204020203" pitchFamily="34" charset="0"/>
-              </a:rPr>
-              <a:t>amet</a:t>
-            </a:r>
-            <a:r>
-              <a:rPr lang="ru-RU" sz="1400" dirty="0">
-                <a:solidFill>
-                  <a:schemeClr val="tx1">
-                    <a:lumMod val="75000"/>
-                    <a:lumOff val="25000"/>
-                  </a:schemeClr>
-                </a:solidFill>
-                <a:cs typeface="Segoe UI" panose="020B0502040204020203" pitchFamily="34" charset="0"/>
-              </a:rPr>
-              <a:t>.</a:t>
-            </a:r>
-          </a:p>
-        </p:txBody>
-      </p:sp>
-      <p:sp>
-        <p:nvSpPr>
-          <p:cNvPr id="88" name="Прямоугольник 87">
-            <a:extLst>
-              <a:ext uri="{FF2B5EF4-FFF2-40B4-BE49-F238E27FC236}">
-                <a16:creationId xmlns:a16="http://schemas.microsoft.com/office/drawing/2014/main" id="{481D58D3-87D7-4D40-B59F-7F751F117F96}"/>
-              </a:ext>
-            </a:extLst>
-          </p:cNvPr>
-          <p:cNvSpPr/>
-          <p:nvPr/>
-        </p:nvSpPr>
-        <p:spPr>
-          <a:xfrm>
-            <a:off x="10576718" y="3478908"/>
-            <a:ext cx="1348582" cy="487313"/>
-          </a:xfrm>
-          <a:prstGeom prst="rect">
-            <a:avLst/>
-          </a:prstGeom>
-        </p:spPr>
-        <p:txBody>
-          <a:bodyPr wrap="square" lIns="0" tIns="0" rIns="0" bIns="0" rtlCol="0" anchor="ctr">
-            <a:spAutoFit/>
-          </a:bodyPr>
-          <a:lstStyle/>
-          <a:p>
-            <a:pPr rtl="0">
-              <a:lnSpc>
-                <a:spcPts val="1900"/>
-              </a:lnSpc>
-            </a:pPr>
-            <a:r>
-              <a:rPr lang="ru-RU" sz="1400" dirty="0" err="1">
-                <a:solidFill>
-                  <a:schemeClr val="tx1">
-                    <a:lumMod val="75000"/>
-                    <a:lumOff val="25000"/>
-                  </a:schemeClr>
-                </a:solidFill>
-                <a:cs typeface="Segoe UI" panose="020B0502040204020203" pitchFamily="34" charset="0"/>
-              </a:rPr>
-              <a:t>Lorem</a:t>
-            </a:r>
-            <a:r>
-              <a:rPr lang="ru-RU" sz="1400" dirty="0">
-                <a:solidFill>
-                  <a:schemeClr val="tx1">
-                    <a:lumMod val="75000"/>
-                    <a:lumOff val="25000"/>
-                  </a:schemeClr>
-                </a:solidFill>
-                <a:cs typeface="Segoe UI" panose="020B0502040204020203" pitchFamily="34" charset="0"/>
-              </a:rPr>
-              <a:t> </a:t>
-            </a:r>
-            <a:r>
-              <a:rPr lang="ru-RU" sz="1400" dirty="0" err="1">
-                <a:solidFill>
-                  <a:schemeClr val="tx1">
-                    <a:lumMod val="75000"/>
-                    <a:lumOff val="25000"/>
-                  </a:schemeClr>
-                </a:solidFill>
-                <a:cs typeface="Segoe UI" panose="020B0502040204020203" pitchFamily="34" charset="0"/>
-              </a:rPr>
-              <a:t>ipsum</a:t>
-            </a:r>
-            <a:r>
-              <a:rPr lang="ru-RU" sz="1400" dirty="0">
-                <a:solidFill>
-                  <a:schemeClr val="tx1">
-                    <a:lumMod val="75000"/>
-                    <a:lumOff val="25000"/>
-                  </a:schemeClr>
-                </a:solidFill>
-                <a:cs typeface="Segoe UI" panose="020B0502040204020203" pitchFamily="34" charset="0"/>
-              </a:rPr>
-              <a:t> </a:t>
-            </a:r>
-            <a:r>
-              <a:rPr lang="ru-RU" sz="1400" dirty="0" err="1">
-                <a:solidFill>
-                  <a:schemeClr val="tx1">
-                    <a:lumMod val="75000"/>
-                    <a:lumOff val="25000"/>
-                  </a:schemeClr>
-                </a:solidFill>
-                <a:cs typeface="Segoe UI" panose="020B0502040204020203" pitchFamily="34" charset="0"/>
-              </a:rPr>
-              <a:t>dolor</a:t>
-            </a:r>
-            <a:r>
-              <a:rPr lang="ru-RU" sz="1400" dirty="0">
-                <a:solidFill>
-                  <a:schemeClr val="tx1">
-                    <a:lumMod val="75000"/>
-                    <a:lumOff val="25000"/>
-                  </a:schemeClr>
-                </a:solidFill>
-                <a:cs typeface="Segoe UI" panose="020B0502040204020203" pitchFamily="34" charset="0"/>
-              </a:rPr>
-              <a:t> </a:t>
-            </a:r>
-            <a:r>
-              <a:rPr lang="ru-RU" sz="1400" dirty="0" err="1">
-                <a:solidFill>
-                  <a:schemeClr val="tx1">
-                    <a:lumMod val="75000"/>
-                    <a:lumOff val="25000"/>
-                  </a:schemeClr>
-                </a:solidFill>
-                <a:cs typeface="Segoe UI" panose="020B0502040204020203" pitchFamily="34" charset="0"/>
-              </a:rPr>
-              <a:t>sit</a:t>
-            </a:r>
-            <a:r>
-              <a:rPr lang="ru-RU" sz="1400" dirty="0">
-                <a:solidFill>
-                  <a:schemeClr val="tx1">
-                    <a:lumMod val="75000"/>
-                    <a:lumOff val="25000"/>
-                  </a:schemeClr>
-                </a:solidFill>
-                <a:cs typeface="Segoe UI" panose="020B0502040204020203" pitchFamily="34" charset="0"/>
-              </a:rPr>
-              <a:t> </a:t>
-            </a:r>
-            <a:r>
-              <a:rPr lang="ru-RU" sz="1400" dirty="0" err="1">
-                <a:solidFill>
-                  <a:schemeClr val="tx1">
-                    <a:lumMod val="75000"/>
-                    <a:lumOff val="25000"/>
-                  </a:schemeClr>
-                </a:solidFill>
-                <a:cs typeface="Segoe UI" panose="020B0502040204020203" pitchFamily="34" charset="0"/>
-              </a:rPr>
-              <a:t>amet</a:t>
-            </a:r>
-            <a:r>
-              <a:rPr lang="ru-RU" sz="1400" dirty="0">
-                <a:solidFill>
-                  <a:schemeClr val="tx1">
-                    <a:lumMod val="75000"/>
-                    <a:lumOff val="25000"/>
-                  </a:schemeClr>
-                </a:solidFill>
-                <a:cs typeface="Segoe UI" panose="020B0502040204020203" pitchFamily="34" charset="0"/>
-              </a:rPr>
-              <a:t>.</a:t>
-            </a:r>
-          </a:p>
-        </p:txBody>
-      </p:sp>
-      <p:sp>
-        <p:nvSpPr>
-          <p:cNvPr id="89" name="Прямоугольник 88">
-            <a:extLst>
-              <a:ext uri="{FF2B5EF4-FFF2-40B4-BE49-F238E27FC236}">
-                <a16:creationId xmlns:a16="http://schemas.microsoft.com/office/drawing/2014/main" id="{AAC2972F-490F-4F2F-8A08-930B8C850374}"/>
-              </a:ext>
-            </a:extLst>
-          </p:cNvPr>
-          <p:cNvSpPr/>
-          <p:nvPr/>
-        </p:nvSpPr>
-        <p:spPr>
-          <a:xfrm>
-            <a:off x="10576718" y="5299888"/>
-            <a:ext cx="1348582" cy="487313"/>
-          </a:xfrm>
-          <a:prstGeom prst="rect">
-            <a:avLst/>
-          </a:prstGeom>
-        </p:spPr>
-        <p:txBody>
-          <a:bodyPr wrap="square" lIns="0" tIns="0" rIns="0" bIns="0" rtlCol="0" anchor="ctr">
-            <a:spAutoFit/>
-          </a:bodyPr>
-          <a:lstStyle/>
-          <a:p>
-            <a:pPr rtl="0">
-              <a:lnSpc>
-                <a:spcPts val="1900"/>
-              </a:lnSpc>
-            </a:pPr>
-            <a:r>
-              <a:rPr lang="ru-RU" sz="1400" dirty="0" err="1">
-                <a:solidFill>
-                  <a:schemeClr val="tx1">
-                    <a:lumMod val="75000"/>
-                    <a:lumOff val="25000"/>
-                  </a:schemeClr>
-                </a:solidFill>
-                <a:cs typeface="Segoe UI" panose="020B0502040204020203" pitchFamily="34" charset="0"/>
-              </a:rPr>
-              <a:t>Lorem</a:t>
-            </a:r>
-            <a:r>
-              <a:rPr lang="ru-RU" sz="1400" dirty="0">
-                <a:solidFill>
-                  <a:schemeClr val="tx1">
-                    <a:lumMod val="75000"/>
-                    <a:lumOff val="25000"/>
-                  </a:schemeClr>
-                </a:solidFill>
-                <a:cs typeface="Segoe UI" panose="020B0502040204020203" pitchFamily="34" charset="0"/>
-              </a:rPr>
-              <a:t> </a:t>
-            </a:r>
-            <a:r>
-              <a:rPr lang="ru-RU" sz="1400" dirty="0" err="1">
-                <a:solidFill>
-                  <a:schemeClr val="tx1">
-                    <a:lumMod val="75000"/>
-                    <a:lumOff val="25000"/>
-                  </a:schemeClr>
-                </a:solidFill>
-                <a:cs typeface="Segoe UI" panose="020B0502040204020203" pitchFamily="34" charset="0"/>
-              </a:rPr>
-              <a:t>ipsum</a:t>
-            </a:r>
-            <a:r>
-              <a:rPr lang="ru-RU" sz="1400" dirty="0">
-                <a:solidFill>
-                  <a:schemeClr val="tx1">
-                    <a:lumMod val="75000"/>
-                    <a:lumOff val="25000"/>
-                  </a:schemeClr>
-                </a:solidFill>
-                <a:cs typeface="Segoe UI" panose="020B0502040204020203" pitchFamily="34" charset="0"/>
-              </a:rPr>
-              <a:t> </a:t>
-            </a:r>
-            <a:r>
-              <a:rPr lang="ru-RU" sz="1400" dirty="0" err="1">
-                <a:solidFill>
-                  <a:schemeClr val="tx1">
-                    <a:lumMod val="75000"/>
-                    <a:lumOff val="25000"/>
-                  </a:schemeClr>
-                </a:solidFill>
-                <a:cs typeface="Segoe UI" panose="020B0502040204020203" pitchFamily="34" charset="0"/>
-              </a:rPr>
-              <a:t>dolor</a:t>
-            </a:r>
-            <a:r>
-              <a:rPr lang="ru-RU" sz="1400" dirty="0">
-                <a:solidFill>
-                  <a:schemeClr val="tx1">
-                    <a:lumMod val="75000"/>
-                    <a:lumOff val="25000"/>
-                  </a:schemeClr>
-                </a:solidFill>
-                <a:cs typeface="Segoe UI" panose="020B0502040204020203" pitchFamily="34" charset="0"/>
-              </a:rPr>
-              <a:t> </a:t>
-            </a:r>
-            <a:r>
-              <a:rPr lang="ru-RU" sz="1400" dirty="0" err="1">
-                <a:solidFill>
-                  <a:schemeClr val="tx1">
-                    <a:lumMod val="75000"/>
-                    <a:lumOff val="25000"/>
-                  </a:schemeClr>
-                </a:solidFill>
-                <a:cs typeface="Segoe UI" panose="020B0502040204020203" pitchFamily="34" charset="0"/>
-              </a:rPr>
-              <a:t>sit</a:t>
-            </a:r>
-            <a:r>
-              <a:rPr lang="ru-RU" sz="1400" dirty="0">
-                <a:solidFill>
-                  <a:schemeClr val="tx1">
-                    <a:lumMod val="75000"/>
-                    <a:lumOff val="25000"/>
-                  </a:schemeClr>
-                </a:solidFill>
-                <a:cs typeface="Segoe UI" panose="020B0502040204020203" pitchFamily="34" charset="0"/>
-              </a:rPr>
-              <a:t> </a:t>
-            </a:r>
-            <a:r>
-              <a:rPr lang="ru-RU" sz="1400" dirty="0" err="1">
-                <a:solidFill>
-                  <a:schemeClr val="tx1">
-                    <a:lumMod val="75000"/>
-                    <a:lumOff val="25000"/>
-                  </a:schemeClr>
-                </a:solidFill>
-                <a:cs typeface="Segoe UI" panose="020B0502040204020203" pitchFamily="34" charset="0"/>
-              </a:rPr>
-              <a:t>amet</a:t>
-            </a:r>
-            <a:r>
-              <a:rPr lang="ru-RU" sz="1400" dirty="0">
-                <a:solidFill>
-                  <a:schemeClr val="tx1">
-                    <a:lumMod val="75000"/>
-                    <a:lumOff val="25000"/>
-                  </a:schemeClr>
-                </a:solidFill>
-                <a:cs typeface="Segoe UI" panose="020B0502040204020203" pitchFamily="34" charset="0"/>
-              </a:rPr>
-              <a:t>.</a:t>
-            </a:r>
-          </a:p>
-        </p:txBody>
-      </p:sp>
-      <p:sp>
-        <p:nvSpPr>
-          <p:cNvPr id="92" name="Прямоугольник 91">
-            <a:extLst>
-              <a:ext uri="{FF2B5EF4-FFF2-40B4-BE49-F238E27FC236}">
-                <a16:creationId xmlns:a16="http://schemas.microsoft.com/office/drawing/2014/main" id="{A69BDC62-882D-49FD-B60A-05F493B04723}"/>
-              </a:ext>
-            </a:extLst>
-          </p:cNvPr>
-          <p:cNvSpPr/>
-          <p:nvPr/>
-        </p:nvSpPr>
-        <p:spPr>
-          <a:xfrm>
-            <a:off x="266700" y="2336397"/>
-            <a:ext cx="1348582" cy="487313"/>
-          </a:xfrm>
-          <a:prstGeom prst="rect">
-            <a:avLst/>
-          </a:prstGeom>
-        </p:spPr>
-        <p:txBody>
-          <a:bodyPr wrap="square" lIns="0" tIns="0" rIns="0" bIns="0" rtlCol="0" anchor="ctr">
-            <a:spAutoFit/>
-          </a:bodyPr>
-          <a:lstStyle/>
-          <a:p>
-            <a:pPr algn="r" rtl="0">
-              <a:lnSpc>
-                <a:spcPts val="1900"/>
-              </a:lnSpc>
-            </a:pPr>
-            <a:r>
-              <a:rPr lang="ru-RU" sz="1400" dirty="0" err="1">
-                <a:solidFill>
-                  <a:schemeClr val="tx1">
-                    <a:lumMod val="75000"/>
-                    <a:lumOff val="25000"/>
-                  </a:schemeClr>
-                </a:solidFill>
-                <a:cs typeface="Segoe UI" panose="020B0502040204020203" pitchFamily="34" charset="0"/>
-              </a:rPr>
-              <a:t>Lorem</a:t>
-            </a:r>
-            <a:r>
-              <a:rPr lang="ru-RU" sz="1400" dirty="0">
-                <a:solidFill>
-                  <a:schemeClr val="tx1">
-                    <a:lumMod val="75000"/>
-                    <a:lumOff val="25000"/>
-                  </a:schemeClr>
-                </a:solidFill>
-                <a:cs typeface="Segoe UI" panose="020B0502040204020203" pitchFamily="34" charset="0"/>
-              </a:rPr>
-              <a:t> </a:t>
-            </a:r>
-            <a:r>
-              <a:rPr lang="ru-RU" sz="1400" dirty="0" err="1">
-                <a:solidFill>
-                  <a:schemeClr val="tx1">
-                    <a:lumMod val="75000"/>
-                    <a:lumOff val="25000"/>
-                  </a:schemeClr>
-                </a:solidFill>
-                <a:cs typeface="Segoe UI" panose="020B0502040204020203" pitchFamily="34" charset="0"/>
-              </a:rPr>
-              <a:t>ipsum</a:t>
-            </a:r>
-            <a:r>
-              <a:rPr lang="ru-RU" sz="1400" dirty="0">
-                <a:solidFill>
-                  <a:schemeClr val="tx1">
-                    <a:lumMod val="75000"/>
-                    <a:lumOff val="25000"/>
-                  </a:schemeClr>
-                </a:solidFill>
-                <a:cs typeface="Segoe UI" panose="020B0502040204020203" pitchFamily="34" charset="0"/>
-              </a:rPr>
-              <a:t> </a:t>
-            </a:r>
-            <a:r>
-              <a:rPr lang="ru-RU" sz="1400" dirty="0" err="1">
-                <a:solidFill>
-                  <a:schemeClr val="tx1">
-                    <a:lumMod val="75000"/>
-                    <a:lumOff val="25000"/>
-                  </a:schemeClr>
-                </a:solidFill>
-                <a:cs typeface="Segoe UI" panose="020B0502040204020203" pitchFamily="34" charset="0"/>
-              </a:rPr>
-              <a:t>dolor</a:t>
-            </a:r>
-            <a:r>
-              <a:rPr lang="ru-RU" sz="1400" dirty="0">
-                <a:solidFill>
-                  <a:schemeClr val="tx1">
-                    <a:lumMod val="75000"/>
-                    <a:lumOff val="25000"/>
-                  </a:schemeClr>
-                </a:solidFill>
-                <a:cs typeface="Segoe UI" panose="020B0502040204020203" pitchFamily="34" charset="0"/>
-              </a:rPr>
-              <a:t> </a:t>
-            </a:r>
-            <a:r>
-              <a:rPr lang="ru-RU" sz="1400" dirty="0" err="1">
-                <a:solidFill>
-                  <a:schemeClr val="tx1">
-                    <a:lumMod val="75000"/>
-                    <a:lumOff val="25000"/>
-                  </a:schemeClr>
-                </a:solidFill>
-                <a:cs typeface="Segoe UI" panose="020B0502040204020203" pitchFamily="34" charset="0"/>
-              </a:rPr>
-              <a:t>sit</a:t>
-            </a:r>
-            <a:r>
-              <a:rPr lang="ru-RU" sz="1400" dirty="0">
-                <a:solidFill>
-                  <a:schemeClr val="tx1">
-                    <a:lumMod val="75000"/>
-                    <a:lumOff val="25000"/>
-                  </a:schemeClr>
-                </a:solidFill>
-                <a:cs typeface="Segoe UI" panose="020B0502040204020203" pitchFamily="34" charset="0"/>
-              </a:rPr>
-              <a:t> </a:t>
-            </a:r>
-            <a:r>
-              <a:rPr lang="ru-RU" sz="1400" dirty="0" err="1">
-                <a:solidFill>
-                  <a:schemeClr val="tx1">
-                    <a:lumMod val="75000"/>
-                    <a:lumOff val="25000"/>
-                  </a:schemeClr>
-                </a:solidFill>
-                <a:cs typeface="Segoe UI" panose="020B0502040204020203" pitchFamily="34" charset="0"/>
-              </a:rPr>
-              <a:t>amet</a:t>
-            </a:r>
-            <a:r>
-              <a:rPr lang="ru-RU" sz="1400" dirty="0">
-                <a:solidFill>
-                  <a:schemeClr val="tx1">
-                    <a:lumMod val="75000"/>
-                    <a:lumOff val="25000"/>
-                  </a:schemeClr>
-                </a:solidFill>
-                <a:cs typeface="Segoe UI" panose="020B0502040204020203" pitchFamily="34" charset="0"/>
-              </a:rPr>
-              <a:t>.</a:t>
-            </a:r>
-          </a:p>
-        </p:txBody>
-      </p:sp>
-      <p:sp>
-        <p:nvSpPr>
-          <p:cNvPr id="93" name="Прямоугольник 92">
-            <a:extLst>
-              <a:ext uri="{FF2B5EF4-FFF2-40B4-BE49-F238E27FC236}">
-                <a16:creationId xmlns:a16="http://schemas.microsoft.com/office/drawing/2014/main" id="{FC109BEC-95E0-4EA0-B65C-A8353481F394}"/>
-              </a:ext>
-            </a:extLst>
-          </p:cNvPr>
-          <p:cNvSpPr/>
-          <p:nvPr/>
-        </p:nvSpPr>
-        <p:spPr>
-          <a:xfrm>
-            <a:off x="266700" y="4621420"/>
-            <a:ext cx="1348582" cy="487313"/>
-          </a:xfrm>
-          <a:prstGeom prst="rect">
-            <a:avLst/>
-          </a:prstGeom>
-        </p:spPr>
-        <p:txBody>
-          <a:bodyPr wrap="square" lIns="0" tIns="0" rIns="0" bIns="0" rtlCol="0" anchor="ctr">
-            <a:spAutoFit/>
-          </a:bodyPr>
-          <a:lstStyle/>
-          <a:p>
-            <a:pPr algn="r" rtl="0">
-              <a:lnSpc>
-                <a:spcPts val="1900"/>
-              </a:lnSpc>
-            </a:pPr>
-            <a:r>
-              <a:rPr lang="ru-RU" sz="1400" dirty="0" err="1">
-                <a:solidFill>
-                  <a:schemeClr val="tx1">
-                    <a:lumMod val="75000"/>
-                    <a:lumOff val="25000"/>
-                  </a:schemeClr>
-                </a:solidFill>
-                <a:cs typeface="Segoe UI" panose="020B0502040204020203" pitchFamily="34" charset="0"/>
-              </a:rPr>
-              <a:t>Lorem</a:t>
-            </a:r>
-            <a:r>
-              <a:rPr lang="ru-RU" sz="1400" dirty="0">
-                <a:solidFill>
-                  <a:schemeClr val="tx1">
-                    <a:lumMod val="75000"/>
-                    <a:lumOff val="25000"/>
-                  </a:schemeClr>
-                </a:solidFill>
-                <a:cs typeface="Segoe UI" panose="020B0502040204020203" pitchFamily="34" charset="0"/>
-              </a:rPr>
-              <a:t> </a:t>
-            </a:r>
-            <a:r>
-              <a:rPr lang="ru-RU" sz="1400" dirty="0" err="1">
-                <a:solidFill>
-                  <a:schemeClr val="tx1">
-                    <a:lumMod val="75000"/>
-                    <a:lumOff val="25000"/>
-                  </a:schemeClr>
-                </a:solidFill>
-                <a:cs typeface="Segoe UI" panose="020B0502040204020203" pitchFamily="34" charset="0"/>
-              </a:rPr>
-              <a:t>ipsum</a:t>
-            </a:r>
-            <a:r>
-              <a:rPr lang="ru-RU" sz="1400" dirty="0">
-                <a:solidFill>
-                  <a:schemeClr val="tx1">
-                    <a:lumMod val="75000"/>
-                    <a:lumOff val="25000"/>
-                  </a:schemeClr>
-                </a:solidFill>
-                <a:cs typeface="Segoe UI" panose="020B0502040204020203" pitchFamily="34" charset="0"/>
-              </a:rPr>
-              <a:t> </a:t>
-            </a:r>
-            <a:r>
-              <a:rPr lang="ru-RU" sz="1400" dirty="0" err="1">
-                <a:solidFill>
-                  <a:schemeClr val="tx1">
-                    <a:lumMod val="75000"/>
-                    <a:lumOff val="25000"/>
-                  </a:schemeClr>
-                </a:solidFill>
-                <a:cs typeface="Segoe UI" panose="020B0502040204020203" pitchFamily="34" charset="0"/>
-              </a:rPr>
-              <a:t>dolor</a:t>
-            </a:r>
-            <a:r>
-              <a:rPr lang="ru-RU" sz="1400" dirty="0">
-                <a:solidFill>
-                  <a:schemeClr val="tx1">
-                    <a:lumMod val="75000"/>
-                    <a:lumOff val="25000"/>
-                  </a:schemeClr>
-                </a:solidFill>
-                <a:cs typeface="Segoe UI" panose="020B0502040204020203" pitchFamily="34" charset="0"/>
-              </a:rPr>
-              <a:t> </a:t>
-            </a:r>
-            <a:r>
-              <a:rPr lang="ru-RU" sz="1400" dirty="0" err="1">
-                <a:solidFill>
-                  <a:schemeClr val="tx1">
-                    <a:lumMod val="75000"/>
-                    <a:lumOff val="25000"/>
-                  </a:schemeClr>
-                </a:solidFill>
-                <a:cs typeface="Segoe UI" panose="020B0502040204020203" pitchFamily="34" charset="0"/>
-              </a:rPr>
-              <a:t>sit</a:t>
-            </a:r>
-            <a:r>
-              <a:rPr lang="ru-RU" sz="1400" dirty="0">
-                <a:solidFill>
-                  <a:schemeClr val="tx1">
-                    <a:lumMod val="75000"/>
-                    <a:lumOff val="25000"/>
-                  </a:schemeClr>
-                </a:solidFill>
-                <a:cs typeface="Segoe UI" panose="020B0502040204020203" pitchFamily="34" charset="0"/>
-              </a:rPr>
-              <a:t> </a:t>
-            </a:r>
-            <a:r>
-              <a:rPr lang="ru-RU" sz="1400" dirty="0" err="1">
-                <a:solidFill>
-                  <a:schemeClr val="tx1">
-                    <a:lumMod val="75000"/>
-                    <a:lumOff val="25000"/>
-                  </a:schemeClr>
-                </a:solidFill>
-                <a:cs typeface="Segoe UI" panose="020B0502040204020203" pitchFamily="34" charset="0"/>
-              </a:rPr>
-              <a:t>amet</a:t>
-            </a:r>
-            <a:r>
-              <a:rPr lang="ru-RU" sz="1400" dirty="0">
-                <a:solidFill>
-                  <a:schemeClr val="tx1">
-                    <a:lumMod val="75000"/>
-                    <a:lumOff val="25000"/>
-                  </a:schemeClr>
-                </a:solidFill>
-                <a:cs typeface="Segoe UI" panose="020B0502040204020203" pitchFamily="34" charset="0"/>
-              </a:rPr>
-              <a:t>.</a:t>
-            </a:r>
-          </a:p>
-        </p:txBody>
-      </p:sp>
     </p:spTree>
     <p:extLst>
       <p:ext uri="{BB962C8B-B14F-4D97-AF65-F5344CB8AC3E}">
@@ -18300,7 +17127,7 @@
                 <a16:creationId xmlns:a16="http://schemas.microsoft.com/office/drawing/2014/main" id="{D0986099-F5F2-4E8B-BE17-81194861A00C}"/>
               </a:ext>
               <a:ext uri="{C183D7F6-B498-43B3-948B-1728B52AA6E4}">
-                <adec:decorative xmlns:adec="http://schemas.microsoft.com/office/drawing/2017/decorative" val="1"/>
+                <adec:decorative xmlns:adec="http://schemas.microsoft.com/office/drawing/2017/decorative" xmlns="" val="1"/>
               </a:ext>
             </a:extLst>
           </p:cNvPr>
@@ -18400,6 +17227,17 @@
               </a:rPr>
               <a:t>Использованные технологии</a:t>
             </a:r>
+            <a:r>
+              <a:rPr lang="ru-RU" sz="2800" dirty="0">
+                <a:solidFill>
+                  <a:schemeClr val="tx1">
+                    <a:lumMod val="75000"/>
+                    <a:lumOff val="25000"/>
+                  </a:schemeClr>
+                </a:solidFill>
+              </a:rPr>
+              <a:t/>
+            </a:r>
             <a:br>
               <a:rPr lang="ru-RU" sz="2800" dirty="0">
                 <a:solidFill>
@@ -18440,7 +17278,7 @@
                 <a16:creationId xmlns:a16="http://schemas.microsoft.com/office/drawing/2014/main" id="{83E690F4-843A-47A5-8620-4FB01C0D8E68}"/>
               </a:ext>
               <a:ext uri="{C183D7F6-B498-43B3-948B-1728B52AA6E4}">
-                <adec:decorative xmlns:adec="http://schemas.microsoft.com/office/drawing/2017/decorative" val="1"/>
+                <adec:decorative xmlns:adec="http://schemas.microsoft.com/office/drawing/2017/decorative" xmlns="" val="1"/>
               </a:ext>
             </a:extLst>
           </p:cNvPr>
@@ -18495,8 +17333,8 @@
         </p:nvSpPr>
         <p:spPr>
           <a:xfrm>
-            <a:off x="228600" y="855297"/>
-            <a:ext cx="10375084" cy="2308324"/>
+            <a:off x="2676524" y="855297"/>
+            <a:ext cx="7927159" cy="6186309"/>
           </a:xfrm>
           <a:prstGeom prst="rect">
             <a:avLst/>
@@ -18509,104 +17347,132 @@
           </a:bodyPr>
           <a:lstStyle/>
           <a:p>
+            <a:pPr marL="285750" indent="-285750">
+              <a:buFont typeface="Arial" panose="020B0604020202020204" pitchFamily="34" charset="0"/>
+              <a:buChar char="•"/>
+            </a:pPr>
             <a:r>
-              <a:rPr lang="en-US" dirty="0"/>
+              <a:rPr lang="en-US" sz="3600" dirty="0"/>
               <a:t>Python 3.</a:t>
             </a:r>
             <a:r>
-              <a:rPr lang="ru-RU" dirty="0"/>
+              <a:rPr lang="ru-RU" sz="3600" dirty="0"/>
               <a:t>8</a:t>
             </a:r>
             <a:r>
-              <a:rPr lang="en-US" dirty="0"/>
+              <a:rPr lang="en-US" sz="3600" dirty="0"/>
               <a:t>.2 </a:t>
             </a:r>
             <a:r>
-              <a:rPr lang="ru-RU" dirty="0"/>
+              <a:rPr lang="ru-RU" sz="3600" dirty="0"/>
               <a:t>– язык программирования</a:t>
             </a:r>
           </a:p>
           <a:p>
+            <a:pPr marL="285750" indent="-285750">
+              <a:buFont typeface="Arial" panose="020B0604020202020204" pitchFamily="34" charset="0"/>
+              <a:buChar char="•"/>
+            </a:pPr>
             <a:r>
-              <a:rPr lang="en-US" dirty="0"/>
+              <a:rPr lang="en-US" sz="3600" dirty="0"/>
               <a:t>HTML </a:t>
             </a:r>
             <a:r>
-              <a:rPr lang="ru-RU" dirty="0"/>
+              <a:rPr lang="ru-RU" sz="3600" dirty="0"/>
               <a:t>– </a:t>
             </a:r>
             <a:r>
-              <a:rPr lang="en-US" dirty="0"/>
+              <a:rPr lang="en-US" sz="3600" dirty="0"/>
               <a:t>no comment</a:t>
             </a:r>
           </a:p>
           <a:p>
+            <a:pPr marL="285750" indent="-285750">
+              <a:buFont typeface="Arial" panose="020B0604020202020204" pitchFamily="34" charset="0"/>
+              <a:buChar char="•"/>
+            </a:pPr>
             <a:r>
-              <a:rPr lang="en-US" dirty="0"/>
+              <a:rPr lang="en-US" sz="3600" dirty="0"/>
               <a:t>Bootstrap - CSS</a:t>
             </a:r>
-            <a:endParaRPr lang="ru-RU" dirty="0"/>
-          </a:p>
-          <a:p>
+            <a:endParaRPr lang="ru-RU" sz="3600" dirty="0"/>
+          </a:p>
+          <a:p>
+            <a:pPr marL="285750" indent="-285750">
+              <a:buFont typeface="Arial" panose="020B0604020202020204" pitchFamily="34" charset="0"/>
+              <a:buChar char="•"/>
+            </a:pPr>
             <a:r>
-              <a:rPr lang="en-US" dirty="0"/>
+              <a:rPr lang="en-US" sz="3600" dirty="0"/>
               <a:t>Flask </a:t>
             </a:r>
             <a:r>
-              <a:rPr lang="ru-RU" dirty="0"/>
+              <a:rPr lang="ru-RU" sz="3600" dirty="0"/>
               <a:t>– основа и движок сайта</a:t>
             </a:r>
-            <a:endParaRPr lang="en-US" dirty="0"/>
-          </a:p>
-          <a:p>
+            <a:endParaRPr lang="en-US" sz="3600" dirty="0"/>
+          </a:p>
+          <a:p>
+            <a:pPr marL="285750" indent="-285750">
+              <a:buFont typeface="Arial" panose="020B0604020202020204" pitchFamily="34" charset="0"/>
+              <a:buChar char="•"/>
+            </a:pPr>
             <a:r>
-              <a:rPr lang="en-US" dirty="0"/>
+              <a:rPr lang="en-US" sz="3600" dirty="0"/>
               <a:t>Flask-</a:t>
             </a:r>
             <a:r>
-              <a:rPr lang="en-US" dirty="0" err="1"/>
+              <a:rPr lang="en-US" sz="3600" dirty="0" err="1"/>
               <a:t>sqlalchemy</a:t>
             </a:r>
             <a:r>
-              <a:rPr lang="en-US" dirty="0"/>
+              <a:rPr lang="en-US" sz="3600" dirty="0"/>
               <a:t> – </a:t>
             </a:r>
             <a:r>
-              <a:rPr lang="ru-RU" dirty="0"/>
+              <a:rPr lang="ru-RU" sz="3600" dirty="0"/>
               <a:t>инструмент для работы с БД</a:t>
             </a:r>
           </a:p>
           <a:p>
+            <a:pPr marL="285750" indent="-285750">
+              <a:buFont typeface="Arial" panose="020B0604020202020204" pitchFamily="34" charset="0"/>
+              <a:buChar char="•"/>
+            </a:pPr>
             <a:r>
-              <a:rPr lang="en-US" dirty="0"/>
+              <a:rPr lang="en-US" sz="3600" dirty="0"/>
               <a:t>Flask-restful </a:t>
             </a:r>
             <a:r>
-              <a:rPr lang="ru-RU" dirty="0"/>
+              <a:rPr lang="ru-RU" sz="3600" dirty="0"/>
               <a:t>– инструмент для полного </a:t>
             </a:r>
             <a:r>
-              <a:rPr lang="en-US" dirty="0"/>
+              <a:rPr lang="en-US" sz="3600" dirty="0"/>
               <a:t>API</a:t>
             </a:r>
           </a:p>
           <a:p>
+            <a:pPr marL="285750" indent="-285750">
+              <a:buFont typeface="Arial" panose="020B0604020202020204" pitchFamily="34" charset="0"/>
+              <a:buChar char="•"/>
+            </a:pPr>
             <a:r>
-              <a:rPr lang="en-US" dirty="0" err="1"/>
+              <a:rPr lang="en-US" sz="3600" dirty="0" err="1"/>
               <a:t>Qrcode</a:t>
             </a:r>
             <a:r>
-              <a:rPr lang="en-US" dirty="0"/>
+              <a:rPr lang="en-US" sz="3600" dirty="0"/>
               <a:t> – QR </a:t>
             </a:r>
             <a:r>
-              <a:rPr lang="ru-RU" dirty="0"/>
+              <a:rPr lang="ru-RU" sz="3600" dirty="0"/>
               <a:t>код</a:t>
             </a:r>
           </a:p>
           <a:p>
             <a:r>
-              <a:rPr lang="ru-RU" dirty="0"/>
+              <a:rPr lang="ru-RU" sz="3600" dirty="0"/>
               <a:t> </a:t>
             </a:r>
           </a:p>
@@ -18692,7 +17558,7 @@
                 <a16:creationId xmlns:a16="http://schemas.microsoft.com/office/drawing/2014/main" id="{D0986099-F5F2-4E8B-BE17-81194861A00C}"/>
               </a:ext>
               <a:ext uri="{C183D7F6-B498-43B3-948B-1728B52AA6E4}">
-                <adec:decorative xmlns:adec="http://schemas.microsoft.com/office/drawing/2017/decorative" val="1"/>
+                <adec:decorative xmlns:adec="http://schemas.microsoft.com/office/drawing/2017/decorative" xmlns="" val="1"/>
               </a:ext>
             </a:extLst>
           </p:cNvPr>
@@ -18749,7 +17615,7 @@
         </p:nvSpPr>
         <p:spPr>
           <a:xfrm>
-            <a:off x="228600" y="190500"/>
+            <a:off x="228600" y="328999"/>
             <a:ext cx="11734800" cy="387798"/>
           </a:xfrm>
           <a:prstGeom prst="rect">
@@ -18811,7 +17677,7 @@
                 <a16:creationId xmlns:a16="http://schemas.microsoft.com/office/drawing/2014/main" id="{83E690F4-843A-47A5-8620-4FB01C0D8E68}"/>
               </a:ext>
               <a:ext uri="{C183D7F6-B498-43B3-948B-1728B52AA6E4}">
-                <adec:decorative xmlns:adec="http://schemas.microsoft.com/office/drawing/2017/decorative" val="1"/>
+                <adec:decorative xmlns:adec="http://schemas.microsoft.com/office/drawing/2017/decorative" xmlns="" val="1"/>
               </a:ext>
             </a:extLst>
           </p:cNvPr>
@@ -18866,8 +17732,8 @@
         </p:nvSpPr>
         <p:spPr>
           <a:xfrm>
-            <a:off x="620511" y="1230814"/>
-            <a:ext cx="11487889" cy="3416320"/>
+            <a:off x="2625627" y="1278439"/>
+            <a:ext cx="6940746" cy="3508653"/>
           </a:xfrm>
           <a:prstGeom prst="rect">
             <a:avLst/>
@@ -18901,11 +17767,8 @@
           <a:p>
             <a:pPr algn="ctr"/>
             <a:r>
-              <a:rPr lang="ru-RU" sz="5400" b="0" cap="none" spc="0" dirty="0">
+              <a:rPr lang="en-US" sz="3000" dirty="0">
                 <a:ln w="0"/>
-                <a:solidFill>
-                  <a:schemeClr val="tx1"/>
-                </a:solidFill>
                 <a:effectLst>
                   <a:outerShdw blurRad="38100" dist="19050" dir="2700000" algn="tl" rotWithShape="0">
                     <a:schemeClr val="dk1">
@@ -18914,8 +17777,21 @@
                   </a:outerShdw>
                 </a:effectLst>
               </a:rPr>
-              <a:t>И</a:t>
+              <a:t>&amp;</a:t>
             </a:r>
+            <a:endParaRPr lang="ru-RU" sz="3000" b="0" cap="none" spc="0" dirty="0">
+              <a:ln w="0"/>
+              <a:solidFill>
+                <a:schemeClr val="tx1"/>
+              </a:solidFill>
+              <a:effectLst>
+                <a:outerShdw blurRad="38100" dist="19050" dir="2700000" algn="tl" rotWithShape="0">
+                  <a:schemeClr val="dk1">
+                    <a:alpha val="40000"/>
+                  </a:schemeClr>
+                </a:outerShdw>
+              </a:effectLst>
+            </a:endParaRPr>
           </a:p>
           <a:p>
             <a:pPr algn="ctr"/>
@@ -18930,13 +17806,39 @@
                   </a:outerShdw>
                 </a:effectLst>
               </a:rPr>
-              <a:t>Черкасов Даниил</a:t>
+              <a:t>Черкасов </a:t>
             </a:r>
+            <a:r>
+              <a:rPr lang="ru-RU" sz="5400" dirty="0" smtClean="0">
+                <a:ln w="0"/>
+                <a:effectLst>
+                  <a:outerShdw blurRad="38100" dist="19050" dir="2700000" algn="tl" rotWithShape="0">
+                    <a:schemeClr val="dk1">
+                      <a:alpha val="40000"/>
+                    </a:schemeClr>
+                  </a:outerShdw>
+                </a:effectLst>
+              </a:rPr>
+              <a:t>Даниил</a:t>
+            </a:r>
+          </a:p>
+          <a:p>
+            <a:pPr algn="ctr"/>
+            <a:endParaRPr lang="ru-RU" sz="5400" dirty="0">
+              <a:ln w="0"/>
+              <a:effectLst>
+                <a:outerShdw blurRad="38100" dist="19050" dir="2700000" algn="tl" rotWithShape="0">
+                  <a:schemeClr val="dk1">
+                    <a:alpha val="40000"/>
+                  </a:schemeClr>
+                </a:outerShdw>
+              </a:effectLst>
+            </a:endParaRPr>
           </a:p>
           <a:p>
             <a:pPr algn="ctr"/>
             <a:r>
-              <a:rPr lang="ru-RU" sz="5400" b="0" cap="none" spc="0" dirty="0">
+              <a:rPr lang="ru-RU" sz="3000" b="0" cap="none" spc="0" dirty="0">
                 <a:ln w="0"/>
                 <a:solidFill>
                   <a:schemeClr val="tx1"/>
@@ -18958,226 +17860,6 @@
     <p:extLst>
       <p:ext uri="{BB962C8B-B14F-4D97-AF65-F5344CB8AC3E}">
         <p14:creationId xmlns:p14="http://schemas.microsoft.com/office/powerpoint/2010/main" val="1061713674"/>
-      </p:ext>
-    </p:extLst>
-  </p:cSld>
-  <p:clrMapOvr>
-    <a:masterClrMapping/>
-  </p:clrMapOvr>
-</p:sld>
-</file>
-
-<file path=ppt/slides/slide7.xml><?xml version="1.0" encoding="utf-8"?>
-<p:sld xmlns:a="http://schemas.openxmlformats.org/drawingml/2006/main" xmlns:r="http://schemas.openxmlformats.org/officeDocument/2006/relationships" xmlns:p="http://schemas.openxmlformats.org/presentationml/2006/main">
-  <p:cSld>
-    <p:bg>
-      <p:bgPr>
-        <a:pattFill prst="zigZag">
-          <a:fgClr>
-            <a:schemeClr val="accent3">
-              <a:lumMod val="75000"/>
-            </a:schemeClr>
-          </a:fgClr>
-          <a:bgClr>
-            <a:schemeClr val="accent3">
-              <a:lumMod val="50000"/>
-            </a:schemeClr>
-          </a:bgClr>
-        </a:pattFill>
-        <a:effectLst/>
-      </p:bgPr>
-    </p:bg>
-    <p:spTree>
-      <p:nvGrpSpPr>
-        <p:cNvPr id="1" name=""/>
-        <p:cNvGrpSpPr/>
-        <p:nvPr/>
-      </p:nvGrpSpPr>
-      <p:grpSpPr>
-        <a:xfrm>
-          <a:off x="0" y="0"/>
-          <a:ext cx="0" cy="0"/>
-          <a:chOff x="0" y="0"/>
-          <a:chExt cx="0" cy="0"/>
-        </a:xfrm>
-      </p:grpSpPr>
-      <p:grpSp>
-        <p:nvGrpSpPr>
-          <p:cNvPr id="11" name="Группа 10">
-            <a:extLst>
-              <a:ext uri="{FF2B5EF4-FFF2-40B4-BE49-F238E27FC236}">
-                <a16:creationId xmlns:a16="http://schemas.microsoft.com/office/drawing/2014/main" id="{62A21665-C64F-4BDA-B2DE-442D70605718}"/>
-              </a:ext>
-              <a:ext uri="{C183D7F6-B498-43B3-948B-1728B52AA6E4}">
-                <adec:decorative xmlns:adec="http://schemas.microsoft.com/office/drawing/2017/decorative" val="1"/>
-              </a:ext>
-            </a:extLst>
-          </p:cNvPr>
-          <p:cNvGrpSpPr/>
-          <p:nvPr/>
-        </p:nvGrpSpPr>
-        <p:grpSpPr>
-          <a:xfrm>
-            <a:off x="4325258" y="1544068"/>
-            <a:ext cx="3541486" cy="3769865"/>
-            <a:chOff x="4325258" y="1229517"/>
-            <a:chExt cx="3541486" cy="3769865"/>
-          </a:xfrm>
-        </p:grpSpPr>
-        <p:sp>
-          <p:nvSpPr>
-            <p:cNvPr id="12" name="Ромб 11">
-              <a:extLst>
-                <a:ext uri="{FF2B5EF4-FFF2-40B4-BE49-F238E27FC236}">
-                  <a16:creationId xmlns:a16="http://schemas.microsoft.com/office/drawing/2014/main" id="{7DC8B409-5FAC-4539-B25A-26BE925A48AF}"/>
-                </a:ext>
-              </a:extLst>
-            </p:cNvPr>
-            <p:cNvSpPr/>
-            <p:nvPr/>
-          </p:nvSpPr>
-          <p:spPr>
-            <a:xfrm>
-              <a:off x="4792319" y="2392018"/>
-              <a:ext cx="2607364" cy="2607364"/>
-            </a:xfrm>
-            <a:prstGeom prst="diamond">
-              <a:avLst/>
-            </a:prstGeom>
-            <a:noFill/>
-            <a:ln>
-              <a:solidFill>
-                <a:schemeClr val="accent3"/>
-              </a:solidFill>
-            </a:ln>
-          </p:spPr>
-          <p:style>
-            <a:lnRef idx="2">
-              <a:schemeClr val="accent1">
-                <a:shade val="50000"/>
-              </a:schemeClr>
-            </a:lnRef>
-            <a:fillRef idx="1">
-              <a:schemeClr val="accent1"/>
-            </a:fillRef>
-            <a:effectRef idx="0">
-              <a:schemeClr val="accent1"/>
-            </a:effectRef>
-            <a:fontRef idx="minor">
-              <a:schemeClr val="lt1"/>
-            </a:fontRef>
-          </p:style>
-          <p:txBody>
-            <a:bodyPr rtlCol="0" anchor="ctr"/>
-            <a:lstStyle/>
-            <a:p>
-              <a:pPr algn="ctr" rtl="0"/>
-              <a:endParaRPr lang="ru-RU" dirty="0"/>
-            </a:p>
-          </p:txBody>
-        </p:sp>
-        <p:sp>
-          <p:nvSpPr>
-            <p:cNvPr id="13" name="Ромб 12">
-              <a:extLst>
-                <a:ext uri="{FF2B5EF4-FFF2-40B4-BE49-F238E27FC236}">
-                  <a16:creationId xmlns:a16="http://schemas.microsoft.com/office/drawing/2014/main" id="{91498E2F-539C-46D3-AF7C-BB1DAE76B114}"/>
-                </a:ext>
-              </a:extLst>
-            </p:cNvPr>
-            <p:cNvSpPr/>
-            <p:nvPr/>
-          </p:nvSpPr>
-          <p:spPr>
-            <a:xfrm>
-              <a:off x="4325258" y="1229517"/>
-              <a:ext cx="3541486" cy="3541486"/>
-            </a:xfrm>
-            <a:prstGeom prst="diamond">
-              <a:avLst/>
-            </a:prstGeom>
-            <a:noFill/>
-            <a:ln>
-              <a:solidFill>
-                <a:schemeClr val="accent4"/>
-              </a:solidFill>
-            </a:ln>
-          </p:spPr>
-          <p:style>
-            <a:lnRef idx="2">
-              <a:schemeClr val="accent1">
-                <a:shade val="50000"/>
-              </a:schemeClr>
-            </a:lnRef>
-            <a:fillRef idx="1">
-              <a:schemeClr val="accent1"/>
-            </a:fillRef>
-            <a:effectRef idx="0">
-              <a:schemeClr val="accent1"/>
-            </a:effectRef>
-            <a:fontRef idx="minor">
-              <a:schemeClr val="lt1"/>
-            </a:fontRef>
-          </p:style>
-          <p:txBody>
-            <a:bodyPr rtlCol="0" anchor="ctr"/>
-            <a:lstStyle/>
-            <a:p>
-              <a:pPr algn="ctr" rtl="0"/>
-              <a:endParaRPr lang="ru-RU" dirty="0"/>
-            </a:p>
-          </p:txBody>
-        </p:sp>
-      </p:grpSp>
-      <p:sp>
-        <p:nvSpPr>
-          <p:cNvPr id="15" name="Заголовок 1">
-            <a:extLst>
-              <a:ext uri="{FF2B5EF4-FFF2-40B4-BE49-F238E27FC236}">
-                <a16:creationId xmlns:a16="http://schemas.microsoft.com/office/drawing/2014/main" id="{FA061601-468D-486D-B8EE-42BD1BE3ADCC}"/>
-              </a:ext>
-            </a:extLst>
-          </p:cNvPr>
-          <p:cNvSpPr>
-            <a:spLocks noGrp="1"/>
-          </p:cNvSpPr>
-          <p:nvPr>
-            <p:ph type="ctrTitle"/>
-          </p:nvPr>
-        </p:nvSpPr>
-        <p:spPr>
-          <a:xfrm>
-            <a:off x="1524000" y="2431805"/>
-            <a:ext cx="9144000" cy="1994392"/>
-          </a:xfrm>
-        </p:spPr>
-        <p:txBody>
-          <a:bodyPr lIns="0" tIns="0" rIns="0" bIns="0" rtlCol="0" anchor="ctr">
-            <a:spAutoFit/>
-          </a:bodyPr>
-          <a:lstStyle/>
-          <a:p>
-            <a:pPr rtl="0"/>
-            <a:r>
-              <a:rPr lang="ru-RU" sz="7200" b="1" dirty="0">
-                <a:solidFill>
-                  <a:schemeClr val="bg1"/>
-                </a:solidFill>
-              </a:rPr>
-              <a:t>Спасибо за внимание</a:t>
-            </a:r>
-            <a:endParaRPr lang="ru-RU" sz="7200" dirty="0">
-              <a:solidFill>
-                <a:schemeClr val="accent4"/>
-              </a:solidFill>
-            </a:endParaRPr>
-          </a:p>
-        </p:txBody>
-      </p:sp>
-    </p:spTree>
-    <p:extLst>
-      <p:ext uri="{BB962C8B-B14F-4D97-AF65-F5344CB8AC3E}">
-        <p14:creationId xmlns:p14="http://schemas.microsoft.com/office/powerpoint/2010/main" val="1923038163"/>
       </p:ext>
     </p:extLst>
   </p:cSld>

</xml_diff>